<commit_message>
proposed subset of feature presentation
</commit_message>
<xml_diff>
--- a/Documentation/5. Heuristic classifier.pptx
+++ b/Documentation/5. Heuristic classifier.pptx
@@ -6302,7 +6302,7 @@
         </p:nvSpPr>
         <p:spPr>
           <a:xfrm>
-            <a:off x="607277" y="1606159"/>
+            <a:off x="218694" y="1483770"/>
             <a:ext cx="9743731" cy="4127129"/>
           </a:xfrm>
         </p:spPr>
@@ -6465,7 +6465,7 @@
         </p:nvSpPr>
         <p:spPr>
           <a:xfrm>
-            <a:off x="1320909" y="4500439"/>
+            <a:off x="745236" y="4296525"/>
             <a:ext cx="1591056" cy="585216"/>
           </a:xfrm>
           <a:prstGeom prst="roundRect">
@@ -6512,10 +6512,10 @@
       </p:sp>
       <p:sp>
         <p:nvSpPr>
-          <p:cNvPr id="5" name="Rettangolo con angoli arrotondati 4">
-            <a:extLst>
-              <a:ext uri="{FF2B5EF4-FFF2-40B4-BE49-F238E27FC236}">
-                <a16:creationId xmlns:a16="http://schemas.microsoft.com/office/drawing/2014/main" id="{825F59FB-A1A7-A26F-B08F-0467319CB1D3}"/>
+          <p:cNvPr id="6" name="Rettangolo 5">
+            <a:extLst>
+              <a:ext uri="{FF2B5EF4-FFF2-40B4-BE49-F238E27FC236}">
+                <a16:creationId xmlns:a16="http://schemas.microsoft.com/office/drawing/2014/main" id="{27C7E533-25B4-11AD-3FD3-26377F6DDABC}"/>
               </a:ext>
             </a:extLst>
           </p:cNvPr>
@@ -6524,66 +6524,7 @@
         </p:nvSpPr>
         <p:spPr>
           <a:xfrm>
-            <a:off x="3625596" y="4334255"/>
-            <a:ext cx="1591056" cy="917585"/>
-          </a:xfrm>
-          <a:prstGeom prst="roundRect">
-            <a:avLst/>
-          </a:prstGeom>
-          <a:noFill/>
-          <a:ln w="28575">
-            <a:solidFill>
-              <a:srgbClr val="0070C0"/>
-            </a:solidFill>
-          </a:ln>
-        </p:spPr>
-        <p:style>
-          <a:lnRef idx="2">
-            <a:schemeClr val="accent1">
-              <a:shade val="15000"/>
-            </a:schemeClr>
-          </a:lnRef>
-          <a:fillRef idx="1">
-            <a:schemeClr val="accent1"/>
-          </a:fillRef>
-          <a:effectRef idx="0">
-            <a:schemeClr val="accent1"/>
-          </a:effectRef>
-          <a:fontRef idx="minor">
-            <a:schemeClr val="lt1"/>
-          </a:fontRef>
-        </p:style>
-        <p:txBody>
-          <a:bodyPr rtlCol="0" anchor="ctr"/>
-          <a:lstStyle/>
-          <a:p>
-            <a:pPr algn="ctr"/>
-            <a:r>
-              <a:rPr lang="en-GB" sz="1400" dirty="0">
-                <a:solidFill>
-                  <a:schemeClr val="tx1"/>
-                </a:solidFill>
-              </a:rPr>
-              <a:t>Does the signal have an atrial peak higher than ventricular one?</a:t>
-            </a:r>
-          </a:p>
-        </p:txBody>
-      </p:sp>
-      <p:sp>
-        <p:nvSpPr>
-          <p:cNvPr id="6" name="Rettangolo 5">
-            <a:extLst>
-              <a:ext uri="{FF2B5EF4-FFF2-40B4-BE49-F238E27FC236}">
-                <a16:creationId xmlns:a16="http://schemas.microsoft.com/office/drawing/2014/main" id="{27C7E533-25B4-11AD-3FD3-26377F6DDABC}"/>
-              </a:ext>
-            </a:extLst>
-          </p:cNvPr>
-          <p:cNvSpPr/>
-          <p:nvPr/>
-        </p:nvSpPr>
-        <p:spPr>
-          <a:xfrm>
-            <a:off x="1750677" y="5819067"/>
+            <a:off x="1175004" y="5975145"/>
             <a:ext cx="731520" cy="247018"/>
           </a:xfrm>
           <a:prstGeom prst="rect">
@@ -6634,7 +6575,7 @@
         </p:nvSpPr>
         <p:spPr>
           <a:xfrm>
-            <a:off x="5876673" y="4669538"/>
+            <a:off x="4435957" y="5979973"/>
             <a:ext cx="731520" cy="247018"/>
           </a:xfrm>
           <a:prstGeom prst="rect">
@@ -6685,7 +6626,7 @@
         </p:nvSpPr>
         <p:spPr>
           <a:xfrm>
-            <a:off x="4053441" y="5816149"/>
+            <a:off x="7246508" y="4461596"/>
             <a:ext cx="731520" cy="247018"/>
           </a:xfrm>
           <a:prstGeom prst="rect">
@@ -6739,8 +6680,8 @@
         </p:nvCxnSpPr>
         <p:spPr>
           <a:xfrm>
-            <a:off x="2116437" y="5085655"/>
-            <a:ext cx="0" cy="733412"/>
+            <a:off x="1540764" y="4881741"/>
+            <a:ext cx="0" cy="1093404"/>
           </a:xfrm>
           <a:prstGeom prst="straightConnector1">
             <a:avLst/>
@@ -6782,8 +6723,8 @@
         </p:nvCxnSpPr>
         <p:spPr>
           <a:xfrm>
-            <a:off x="2911965" y="4793047"/>
-            <a:ext cx="713631" cy="1"/>
+            <a:off x="2336292" y="4589133"/>
+            <a:ext cx="802812" cy="0"/>
           </a:xfrm>
           <a:prstGeom prst="straightConnector1">
             <a:avLst/>
@@ -6819,14 +6760,14 @@
           <p:cNvCxnSpPr>
             <a:cxnSpLocks/>
             <a:stCxn id="5" idx="3"/>
-            <a:endCxn id="7" idx="1"/>
+            <a:endCxn id="8" idx="1"/>
           </p:cNvCxnSpPr>
           <p:nvPr/>
         </p:nvCxnSpPr>
         <p:spPr>
           <a:xfrm flipV="1">
-            <a:off x="5216652" y="4793047"/>
-            <a:ext cx="660021" cy="1"/>
+            <a:off x="6464330" y="4585105"/>
+            <a:ext cx="782178" cy="4028"/>
           </a:xfrm>
           <a:prstGeom prst="straightConnector1">
             <a:avLst/>
@@ -6861,14 +6802,15 @@
           </p:cNvPr>
           <p:cNvCxnSpPr>
             <a:cxnSpLocks/>
-            <a:endCxn id="8" idx="0"/>
+            <a:stCxn id="5" idx="2"/>
+            <a:endCxn id="7" idx="0"/>
           </p:cNvCxnSpPr>
           <p:nvPr/>
         </p:nvCxnSpPr>
         <p:spPr>
-          <a:xfrm flipH="1">
-            <a:off x="4419201" y="5242696"/>
-            <a:ext cx="6495" cy="573453"/>
+          <a:xfrm>
+            <a:off x="4801717" y="4962259"/>
+            <a:ext cx="0" cy="1017714"/>
           </a:xfrm>
           <a:prstGeom prst="straightConnector1">
             <a:avLst/>
@@ -6906,7 +6848,7 @@
         </p:nvSpPr>
         <p:spPr>
           <a:xfrm>
-            <a:off x="3011424" y="4477686"/>
+            <a:off x="2421348" y="4216006"/>
             <a:ext cx="505968" cy="307777"/>
           </a:xfrm>
           <a:prstGeom prst="rect">
@@ -6941,7 +6883,7 @@
         </p:nvSpPr>
         <p:spPr>
           <a:xfrm>
-            <a:off x="5316112" y="4477685"/>
+            <a:off x="6541407" y="4244277"/>
             <a:ext cx="505968" cy="307777"/>
           </a:xfrm>
           <a:prstGeom prst="rect">
@@ -6976,7 +6918,7 @@
         </p:nvSpPr>
         <p:spPr>
           <a:xfrm>
-            <a:off x="4421124" y="5381564"/>
+            <a:off x="4811978" y="5333719"/>
             <a:ext cx="505968" cy="307777"/>
           </a:xfrm>
           <a:prstGeom prst="rect">
@@ -7011,7 +6953,7 @@
         </p:nvSpPr>
         <p:spPr>
           <a:xfrm>
-            <a:off x="2116436" y="5381564"/>
+            <a:off x="1527613" y="5364317"/>
             <a:ext cx="505968" cy="307777"/>
           </a:xfrm>
           <a:prstGeom prst="rect">
@@ -7093,7 +7035,7 @@
         </p:nvSpPr>
         <p:spPr>
           <a:xfrm>
-            <a:off x="7490461" y="4333180"/>
+            <a:off x="8107832" y="4282680"/>
             <a:ext cx="3863339" cy="1606478"/>
           </a:xfrm>
           <a:prstGeom prst="roundRect">
@@ -7222,7 +7164,7 @@
             </a:r>
             <a:r>
               <a:rPr lang="en-GB" sz="1200" dirty="0"/>
-              <a:t> (e.g. noisy record).</a:t>
+              <a:t> (e.g. noisy record), because the first condition is “does the signal have a ventricular peak”.</a:t>
             </a:r>
           </a:p>
           <a:p>
@@ -7273,6 +7215,245 @@
           </a:p>
         </p:txBody>
       </p:sp>
+      <p:grpSp>
+        <p:nvGrpSpPr>
+          <p:cNvPr id="37" name="Gruppo 36">
+            <a:extLst>
+              <a:ext uri="{FF2B5EF4-FFF2-40B4-BE49-F238E27FC236}">
+                <a16:creationId xmlns:a16="http://schemas.microsoft.com/office/drawing/2014/main" id="{DB981D36-CFF4-0C9A-96C7-EBD2B708F679}"/>
+              </a:ext>
+            </a:extLst>
+          </p:cNvPr>
+          <p:cNvGrpSpPr/>
+          <p:nvPr/>
+        </p:nvGrpSpPr>
+        <p:grpSpPr>
+          <a:xfrm>
+            <a:off x="3139104" y="4216006"/>
+            <a:ext cx="3325226" cy="746253"/>
+            <a:chOff x="3625596" y="3904489"/>
+            <a:chExt cx="1591056" cy="746253"/>
+          </a:xfrm>
+        </p:grpSpPr>
+        <p:sp>
+          <p:nvSpPr>
+            <p:cNvPr id="5" name="Rettangolo con angoli arrotondati 4">
+              <a:extLst>
+                <a:ext uri="{FF2B5EF4-FFF2-40B4-BE49-F238E27FC236}">
+                  <a16:creationId xmlns:a16="http://schemas.microsoft.com/office/drawing/2014/main" id="{825F59FB-A1A7-A26F-B08F-0467319CB1D3}"/>
+                </a:ext>
+              </a:extLst>
+            </p:cNvPr>
+            <p:cNvSpPr/>
+            <p:nvPr/>
+          </p:nvSpPr>
+          <p:spPr>
+            <a:xfrm>
+              <a:off x="3625596" y="3904489"/>
+              <a:ext cx="1591056" cy="746253"/>
+            </a:xfrm>
+            <a:prstGeom prst="roundRect">
+              <a:avLst>
+                <a:gd name="adj" fmla="val 6370"/>
+              </a:avLst>
+            </a:prstGeom>
+            <a:noFill/>
+            <a:ln w="28575">
+              <a:solidFill>
+                <a:schemeClr val="accent5">
+                  <a:lumMod val="40000"/>
+                  <a:lumOff val="60000"/>
+                </a:schemeClr>
+              </a:solidFill>
+            </a:ln>
+          </p:spPr>
+          <p:style>
+            <a:lnRef idx="2">
+              <a:schemeClr val="accent1">
+                <a:shade val="15000"/>
+              </a:schemeClr>
+            </a:lnRef>
+            <a:fillRef idx="1">
+              <a:schemeClr val="accent1"/>
+            </a:fillRef>
+            <a:effectRef idx="0">
+              <a:schemeClr val="accent1"/>
+            </a:effectRef>
+            <a:fontRef idx="minor">
+              <a:schemeClr val="lt1"/>
+            </a:fontRef>
+          </p:style>
+          <p:txBody>
+            <a:bodyPr rtlCol="0" anchor="ctr"/>
+            <a:lstStyle/>
+            <a:p>
+              <a:pPr algn="ctr"/>
+              <a:endParaRPr lang="en-GB" sz="1400" dirty="0">
+                <a:solidFill>
+                  <a:schemeClr val="tx1"/>
+                </a:solidFill>
+              </a:endParaRPr>
+            </a:p>
+          </p:txBody>
+        </p:sp>
+        <p:sp>
+          <p:nvSpPr>
+            <p:cNvPr id="24" name="Rettangolo con angoli arrotondati 23">
+              <a:extLst>
+                <a:ext uri="{FF2B5EF4-FFF2-40B4-BE49-F238E27FC236}">
+                  <a16:creationId xmlns:a16="http://schemas.microsoft.com/office/drawing/2014/main" id="{57E7D106-18C7-8840-1832-D203EB595DC6}"/>
+                </a:ext>
+              </a:extLst>
+            </p:cNvPr>
+            <p:cNvSpPr/>
+            <p:nvPr/>
+          </p:nvSpPr>
+          <p:spPr>
+            <a:xfrm>
+              <a:off x="4509138" y="3979672"/>
+              <a:ext cx="670344" cy="605565"/>
+            </a:xfrm>
+            <a:prstGeom prst="roundRect">
+              <a:avLst/>
+            </a:prstGeom>
+            <a:noFill/>
+            <a:ln w="28575">
+              <a:solidFill>
+                <a:srgbClr val="0070C0"/>
+              </a:solidFill>
+            </a:ln>
+          </p:spPr>
+          <p:style>
+            <a:lnRef idx="2">
+              <a:schemeClr val="accent1">
+                <a:shade val="15000"/>
+              </a:schemeClr>
+            </a:lnRef>
+            <a:fillRef idx="1">
+              <a:schemeClr val="accent1"/>
+            </a:fillRef>
+            <a:effectRef idx="0">
+              <a:schemeClr val="accent1"/>
+            </a:effectRef>
+            <a:fontRef idx="minor">
+              <a:schemeClr val="lt1"/>
+            </a:fontRef>
+          </p:style>
+          <p:txBody>
+            <a:bodyPr rtlCol="0" anchor="ctr"/>
+            <a:lstStyle/>
+            <a:p>
+              <a:pPr algn="ctr"/>
+              <a:r>
+                <a:rPr lang="en-GB" sz="1200" dirty="0">
+                  <a:solidFill>
+                    <a:schemeClr val="tx1"/>
+                  </a:solidFill>
+                </a:rPr>
+                <a:t>Does the signal have a ventricular  peak? </a:t>
+              </a:r>
+            </a:p>
+          </p:txBody>
+        </p:sp>
+        <p:sp>
+          <p:nvSpPr>
+            <p:cNvPr id="26" name="Rettangolo con angoli arrotondati 25">
+              <a:extLst>
+                <a:ext uri="{FF2B5EF4-FFF2-40B4-BE49-F238E27FC236}">
+                  <a16:creationId xmlns:a16="http://schemas.microsoft.com/office/drawing/2014/main" id="{D0ED1A5E-1EBD-CA70-9475-20C2CEBF59BF}"/>
+                </a:ext>
+              </a:extLst>
+            </p:cNvPr>
+            <p:cNvSpPr/>
+            <p:nvPr/>
+          </p:nvSpPr>
+          <p:spPr>
+            <a:xfrm>
+              <a:off x="3662476" y="3987557"/>
+              <a:ext cx="670344" cy="597680"/>
+            </a:xfrm>
+            <a:prstGeom prst="roundRect">
+              <a:avLst/>
+            </a:prstGeom>
+            <a:noFill/>
+            <a:ln w="28575">
+              <a:solidFill>
+                <a:srgbClr val="0070C0"/>
+              </a:solidFill>
+            </a:ln>
+          </p:spPr>
+          <p:style>
+            <a:lnRef idx="2">
+              <a:schemeClr val="accent1">
+                <a:shade val="15000"/>
+              </a:schemeClr>
+            </a:lnRef>
+            <a:fillRef idx="1">
+              <a:schemeClr val="accent1"/>
+            </a:fillRef>
+            <a:effectRef idx="0">
+              <a:schemeClr val="accent1"/>
+            </a:effectRef>
+            <a:fontRef idx="minor">
+              <a:schemeClr val="lt1"/>
+            </a:fontRef>
+          </p:style>
+          <p:txBody>
+            <a:bodyPr rtlCol="0" anchor="ctr"/>
+            <a:lstStyle/>
+            <a:p>
+              <a:pPr algn="ctr"/>
+              <a:r>
+                <a:rPr lang="en-GB" sz="1200" dirty="0">
+                  <a:solidFill>
+                    <a:schemeClr val="tx1"/>
+                  </a:solidFill>
+                </a:rPr>
+                <a:t>Is the ventricular peak lower than atrial one?</a:t>
+              </a:r>
+            </a:p>
+          </p:txBody>
+        </p:sp>
+        <p:sp>
+          <p:nvSpPr>
+            <p:cNvPr id="31" name="CasellaDiTesto 30">
+              <a:extLst>
+                <a:ext uri="{FF2B5EF4-FFF2-40B4-BE49-F238E27FC236}">
+                  <a16:creationId xmlns:a16="http://schemas.microsoft.com/office/drawing/2014/main" id="{1F0F3E7D-7C19-2F1C-C77E-B532BE5DCDF0}"/>
+                </a:ext>
+              </a:extLst>
+            </p:cNvPr>
+            <p:cNvSpPr txBox="1"/>
+            <p:nvPr/>
+          </p:nvSpPr>
+          <p:spPr>
+            <a:xfrm>
+              <a:off x="4315215" y="4128565"/>
+              <a:ext cx="217044" cy="307777"/>
+            </a:xfrm>
+            <a:prstGeom prst="rect">
+              <a:avLst/>
+            </a:prstGeom>
+            <a:noFill/>
+          </p:spPr>
+          <p:txBody>
+            <a:bodyPr wrap="square" rtlCol="0">
+              <a:spAutoFit/>
+            </a:bodyPr>
+            <a:lstStyle/>
+            <a:p>
+              <a:r>
+                <a:rPr lang="it-IT" sz="1400" b="1" dirty="0">
+                  <a:solidFill>
+                    <a:srgbClr val="0070C0"/>
+                  </a:solidFill>
+                </a:rPr>
+                <a:t>OR</a:t>
+              </a:r>
+            </a:p>
+          </p:txBody>
+        </p:sp>
+      </p:grpSp>
     </p:spTree>
     <p:extLst>
       <p:ext uri="{BB962C8B-B14F-4D97-AF65-F5344CB8AC3E}">
@@ -7728,10 +7909,10 @@
       </p:sp>
       <p:pic>
         <p:nvPicPr>
-          <p:cNvPr id="5" name="Immagine 4">
-            <a:extLst>
-              <a:ext uri="{FF2B5EF4-FFF2-40B4-BE49-F238E27FC236}">
-                <a16:creationId xmlns:a16="http://schemas.microsoft.com/office/drawing/2014/main" id="{D4C7E68B-7595-7125-E38B-AA9DAB4658D7}"/>
+          <p:cNvPr id="6" name="Immagine 5" descr="Immagine che contiene testo, schermata, numero, Carattere&#10;&#10;Descrizione generata automaticamente">
+            <a:extLst>
+              <a:ext uri="{FF2B5EF4-FFF2-40B4-BE49-F238E27FC236}">
+                <a16:creationId xmlns:a16="http://schemas.microsoft.com/office/drawing/2014/main" id="{DCF0BA9F-AA61-36B4-A040-3156D9285655}"/>
               </a:ext>
             </a:extLst>
           </p:cNvPr>
@@ -7754,7 +7935,7 @@
         </p:blipFill>
         <p:spPr>
           <a:xfrm>
-            <a:off x="5692140" y="2179320"/>
+            <a:off x="5790930" y="2120523"/>
             <a:ext cx="5486682" cy="3657788"/>
           </a:xfrm>
           <a:prstGeom prst="rect">
@@ -7764,10 +7945,10 @@
       </p:pic>
       <p:pic>
         <p:nvPicPr>
-          <p:cNvPr id="7" name="Immagine 6" descr="Immagine che contiene testo, schermata, numero, diagramma&#10;&#10;Descrizione generata automaticamente">
-            <a:extLst>
-              <a:ext uri="{FF2B5EF4-FFF2-40B4-BE49-F238E27FC236}">
-                <a16:creationId xmlns:a16="http://schemas.microsoft.com/office/drawing/2014/main" id="{044BA909-BEF3-2076-D4A4-082F69229582}"/>
+          <p:cNvPr id="10" name="Immagine 9" descr="Immagine che contiene testo, schermata, numero, Carattere&#10;&#10;Descrizione generata automaticamente">
+            <a:extLst>
+              <a:ext uri="{FF2B5EF4-FFF2-40B4-BE49-F238E27FC236}">
+                <a16:creationId xmlns:a16="http://schemas.microsoft.com/office/drawing/2014/main" id="{BA787D21-AB9C-D701-53B1-E114E7F0E6BA}"/>
               </a:ext>
             </a:extLst>
           </p:cNvPr>
@@ -7790,7 +7971,7 @@
         </p:blipFill>
         <p:spPr>
           <a:xfrm>
-            <a:off x="464256" y="2179320"/>
+            <a:off x="607277" y="2120523"/>
             <a:ext cx="5486682" cy="3657788"/>
           </a:xfrm>
           <a:prstGeom prst="rect">
@@ -8021,7 +8202,7 @@
           <p:nvPr>
             <p:extLst>
               <p:ext uri="{D42A27DB-BD31-4B8C-83A1-F6EECF244321}">
-                <p14:modId xmlns:p14="http://schemas.microsoft.com/office/powerpoint/2010/main" val="804924939"/>
+                <p14:modId xmlns:p14="http://schemas.microsoft.com/office/powerpoint/2010/main" val="529515908"/>
               </p:ext>
             </p:extLst>
           </p:nvPr>
@@ -8179,7 +8360,7 @@
                       <a:pPr algn="ctr"/>
                       <a:r>
                         <a:rPr lang="en-GB" sz="1400" noProof="0" dirty="0"/>
-                        <a:t>0.76</a:t>
+                        <a:t>0.82</a:t>
                       </a:r>
                     </a:p>
                   </a:txBody>
@@ -8193,7 +8374,7 @@
                       <a:pPr algn="ctr"/>
                       <a:r>
                         <a:rPr lang="en-GB" sz="1400" noProof="0" dirty="0"/>
-                        <a:t>0.35</a:t>
+                        <a:t>0.42</a:t>
                       </a:r>
                     </a:p>
                   </a:txBody>
@@ -8207,7 +8388,7 @@
                       <a:pPr algn="ctr"/>
                       <a:r>
                         <a:rPr lang="en-GB" sz="1400" noProof="0" dirty="0"/>
-                        <a:t>0.48</a:t>
+                        <a:t>0.56</a:t>
                       </a:r>
                     </a:p>
                   </a:txBody>
@@ -8263,7 +8444,7 @@
                       <a:pPr algn="ctr"/>
                       <a:r>
                         <a:rPr lang="en-GB" sz="1400" noProof="0" dirty="0"/>
-                        <a:t>0.14</a:t>
+                        <a:t>0.13</a:t>
                       </a:r>
                     </a:p>
                   </a:txBody>
@@ -8277,7 +8458,7 @@
                       <a:pPr algn="ctr"/>
                       <a:r>
                         <a:rPr lang="en-GB" sz="1400" noProof="0" dirty="0"/>
-                        <a:t>0.72</a:t>
+                        <a:t>0.63</a:t>
                       </a:r>
                     </a:p>
                   </a:txBody>
@@ -8291,7 +8472,7 @@
                       <a:pPr algn="ctr"/>
                       <a:r>
                         <a:rPr lang="en-GB" sz="1400" noProof="0" dirty="0"/>
-                        <a:t>0.23</a:t>
+                        <a:t>0.22</a:t>
                       </a:r>
                     </a:p>
                   </a:txBody>
@@ -8346,10 +8527,9 @@
                     <a:p>
                       <a:pPr algn="ctr"/>
                       <a:r>
-                        <a:rPr lang="en-GB" sz="1400" noProof="0"/>
+                        <a:rPr lang="en-GB" sz="1400" noProof="0" dirty="0"/>
                         <a:t>0.57</a:t>
                       </a:r>
-                      <a:endParaRPr lang="en-GB" sz="1400" noProof="0" dirty="0"/>
                     </a:p>
                   </a:txBody>
                   <a:tcPr anchor="ctr"/>
@@ -8361,10 +8541,9 @@
                     <a:p>
                       <a:pPr algn="ctr"/>
                       <a:r>
-                        <a:rPr lang="en-GB" sz="1400" noProof="0"/>
+                        <a:rPr lang="en-GB" sz="1400" noProof="0" dirty="0"/>
                         <a:t>0.25</a:t>
                       </a:r>
-                      <a:endParaRPr lang="en-GB" sz="1400" noProof="0" dirty="0"/>
                     </a:p>
                   </a:txBody>
                   <a:tcPr anchor="ctr"/>
@@ -8506,7 +8685,7 @@
                       <a:pPr algn="ctr"/>
                       <a:r>
                         <a:rPr lang="en-GB" sz="1400" noProof="0" dirty="0"/>
-                        <a:t>0.38</a:t>
+                        <a:t>0.43</a:t>
                       </a:r>
                     </a:p>
                   </a:txBody>
@@ -8560,7 +8739,7 @@
                       <a:pPr algn="ctr"/>
                       <a:r>
                         <a:rPr lang="en-GB" sz="1400" noProof="0" dirty="0"/>
-                        <a:t>0.49</a:t>
+                        <a:t>0.50</a:t>
                       </a:r>
                     </a:p>
                   </a:txBody>
@@ -8574,7 +8753,7 @@
                       <a:pPr algn="ctr"/>
                       <a:r>
                         <a:rPr lang="en-GB" sz="1400" noProof="0" dirty="0"/>
-                        <a:t>0.44</a:t>
+                        <a:t>0.43</a:t>
                       </a:r>
                     </a:p>
                   </a:txBody>
@@ -8588,7 +8767,7 @@
                       <a:pPr algn="ctr"/>
                       <a:r>
                         <a:rPr lang="en-GB" sz="1400" noProof="0" dirty="0"/>
-                        <a:t>0.35</a:t>
+                        <a:t>0.37</a:t>
                       </a:r>
                     </a:p>
                   </a:txBody>
@@ -8642,21 +8821,7 @@
                       <a:pPr algn="ctr"/>
                       <a:r>
                         <a:rPr lang="en-GB" sz="1400" noProof="0" dirty="0"/>
-                        <a:t>0.67</a:t>
-                      </a:r>
-                    </a:p>
-                  </a:txBody>
-                  <a:tcPr anchor="ctr"/>
-                </a:tc>
-                <a:tc>
-                  <a:txBody>
-                    <a:bodyPr/>
-                    <a:lstStyle/>
-                    <a:p>
-                      <a:pPr algn="ctr"/>
-                      <a:r>
-                        <a:rPr lang="en-GB" sz="1400" noProof="0" dirty="0"/>
-                        <a:t>0.38</a:t>
+                        <a:t>0.71</a:t>
                       </a:r>
                     </a:p>
                   </a:txBody>
@@ -8671,6 +8836,20 @@
                       <a:r>
                         <a:rPr lang="en-GB" sz="1400" noProof="0" dirty="0"/>
                         <a:t>0.43</a:t>
+                      </a:r>
+                    </a:p>
+                  </a:txBody>
+                  <a:tcPr anchor="ctr"/>
+                </a:tc>
+                <a:tc>
+                  <a:txBody>
+                    <a:bodyPr/>
+                    <a:lstStyle/>
+                    <a:p>
+                      <a:pPr algn="ctr"/>
+                      <a:r>
+                        <a:rPr lang="en-GB" sz="1400" noProof="0" dirty="0"/>
+                        <a:t>0.49</a:t>
                       </a:r>
                     </a:p>
                   </a:txBody>
@@ -9768,13 +9947,24 @@
             </a:pPr>
             <a:r>
               <a:rPr lang="en-US" sz="1600" dirty="0"/>
-              <a:t>In general:</a:t>
+              <a:t>In general, performance are not satisfying, as it could be imaged. Precisely:</a:t>
             </a:r>
           </a:p>
           <a:p>
             <a:r>
               <a:rPr lang="en-US" sz="1600" b="1" dirty="0"/>
-              <a:t>Map A, Map B and C are  bad classified</a:t>
+              <a:t>Map A, </a:t>
+            </a:r>
+            <a:r>
+              <a:rPr lang="en-US" sz="1600" dirty="0"/>
+              <a:t>is fairly well classified, with sufficient f1-score and good precision, but low recall, meaning that there’s a huge percentage of FN.</a:t>
+            </a:r>
+            <a:endParaRPr lang="en-US" sz="1600" b="1" dirty="0"/>
+          </a:p>
+          <a:p>
+            <a:r>
+              <a:rPr lang="en-US" sz="1600" b="1" dirty="0"/>
+              <a:t>Map B and C are  bad classified</a:t>
             </a:r>
             <a:r>
               <a:rPr lang="en-US" sz="1600" dirty="0"/>
@@ -9786,14 +9976,64 @@
             </a:r>
             <a:r>
               <a:rPr lang="en-US" sz="1600" dirty="0"/>
-              <a:t>This leads to the conclusion that the </a:t>
+              <a:t>It should be noted that </a:t>
             </a:r>
             <a:r>
               <a:rPr lang="en-US" sz="1600" b="1" dirty="0"/>
-              <a:t>heuristic classifier does not correctly classify these classes, with a high rate of positive samples misclassified or with high rate of false positive.</a:t>
-            </a:r>
-          </a:p>
-          <a:p>
+              <a:t>Map B</a:t>
+            </a:r>
+            <a:r>
+              <a:rPr lang="en-US" sz="1600" dirty="0"/>
+              <a:t> has </a:t>
+            </a:r>
+            <a:r>
+              <a:rPr lang="en-US" sz="1600" b="1" dirty="0"/>
+              <a:t>sufficient</a:t>
+            </a:r>
+            <a:r>
+              <a:rPr lang="en-US" sz="1600" dirty="0"/>
+              <a:t> </a:t>
+            </a:r>
+            <a:r>
+              <a:rPr lang="en-US" sz="1600" b="1" dirty="0"/>
+              <a:t>recall</a:t>
+            </a:r>
+            <a:r>
+              <a:rPr lang="en-US" sz="1600" dirty="0"/>
+              <a:t> (i.e.,. FN are less than TP), while </a:t>
+            </a:r>
+            <a:r>
+              <a:rPr lang="en-US" sz="1600" b="1" dirty="0"/>
+              <a:t>Map</a:t>
+            </a:r>
+            <a:r>
+              <a:rPr lang="en-US" sz="1600" dirty="0"/>
+              <a:t> </a:t>
+            </a:r>
+            <a:r>
+              <a:rPr lang="en-US" sz="1600" b="1" dirty="0"/>
+              <a:t>C</a:t>
+            </a:r>
+            <a:r>
+              <a:rPr lang="en-US" sz="1600" dirty="0"/>
+              <a:t> has a </a:t>
+            </a:r>
+            <a:r>
+              <a:rPr lang="en-US" sz="1600" b="1" dirty="0"/>
+              <a:t>sufficient</a:t>
+            </a:r>
+            <a:r>
+              <a:rPr lang="en-US" sz="1600" dirty="0"/>
+              <a:t> </a:t>
+            </a:r>
+            <a:r>
+              <a:rPr lang="en-US" sz="1600" b="1" dirty="0"/>
+              <a:t>precision</a:t>
+            </a:r>
+            <a:r>
+              <a:rPr lang="en-US" sz="1600" dirty="0"/>
+              <a:t> (i.e., FP are less than TP)</a:t>
+            </a:r>
             <a:endParaRPr lang="en-US" sz="1600" b="1" dirty="0"/>
           </a:p>
           <a:p>

</xml_diff>

<commit_message>
strategy A heuristic pptx done
</commit_message>
<xml_diff>
--- a/Documentation/5. Heuristic classifier.pptx
+++ b/Documentation/5. Heuristic classifier.pptx
@@ -5,7 +5,7 @@
     <p:sldMasterId id="2147483661" r:id="rId1"/>
   </p:sldMasterIdLst>
   <p:notesMasterIdLst>
-    <p:notesMasterId r:id="rId28"/>
+    <p:notesMasterId r:id="rId29"/>
   </p:notesMasterIdLst>
   <p:sldIdLst>
     <p:sldId id="573" r:id="rId2"/>
@@ -21,19 +21,20 @@
     <p:sldId id="641" r:id="rId12"/>
     <p:sldId id="635" r:id="rId13"/>
     <p:sldId id="650" r:id="rId14"/>
-    <p:sldId id="642" r:id="rId15"/>
-    <p:sldId id="651" r:id="rId16"/>
-    <p:sldId id="652" r:id="rId17"/>
-    <p:sldId id="653" r:id="rId18"/>
-    <p:sldId id="647" r:id="rId19"/>
-    <p:sldId id="648" r:id="rId20"/>
-    <p:sldId id="649" r:id="rId21"/>
-    <p:sldId id="636" r:id="rId22"/>
-    <p:sldId id="645" r:id="rId23"/>
-    <p:sldId id="637" r:id="rId24"/>
-    <p:sldId id="646" r:id="rId25"/>
-    <p:sldId id="643" r:id="rId26"/>
-    <p:sldId id="638" r:id="rId27"/>
+    <p:sldId id="654" r:id="rId15"/>
+    <p:sldId id="642" r:id="rId16"/>
+    <p:sldId id="651" r:id="rId17"/>
+    <p:sldId id="652" r:id="rId18"/>
+    <p:sldId id="653" r:id="rId19"/>
+    <p:sldId id="647" r:id="rId20"/>
+    <p:sldId id="648" r:id="rId21"/>
+    <p:sldId id="649" r:id="rId22"/>
+    <p:sldId id="636" r:id="rId23"/>
+    <p:sldId id="645" r:id="rId24"/>
+    <p:sldId id="637" r:id="rId25"/>
+    <p:sldId id="646" r:id="rId26"/>
+    <p:sldId id="643" r:id="rId27"/>
+    <p:sldId id="638" r:id="rId28"/>
   </p:sldIdLst>
   <p:sldSz cx="12192000" cy="6858000"/>
   <p:notesSz cx="6858000" cy="9144000"/>
@@ -905,6 +906,114 @@
         <p:cNvPr id="1" name="">
           <a:extLst>
             <a:ext uri="{FF2B5EF4-FFF2-40B4-BE49-F238E27FC236}">
+              <a16:creationId xmlns:a16="http://schemas.microsoft.com/office/drawing/2014/main" id="{8AF4A77A-6C6B-1D3A-60D1-EEF9166664E1}"/>
+            </a:ext>
+          </a:extLst>
+        </p:cNvPr>
+        <p:cNvGrpSpPr/>
+        <p:nvPr/>
+      </p:nvGrpSpPr>
+      <p:grpSpPr>
+        <a:xfrm>
+          <a:off x="0" y="0"/>
+          <a:ext cx="0" cy="0"/>
+          <a:chOff x="0" y="0"/>
+          <a:chExt cx="0" cy="0"/>
+        </a:xfrm>
+      </p:grpSpPr>
+      <p:sp>
+        <p:nvSpPr>
+          <p:cNvPr id="2" name="Segnaposto immagine diapositiva 1">
+            <a:extLst>
+              <a:ext uri="{FF2B5EF4-FFF2-40B4-BE49-F238E27FC236}">
+                <a16:creationId xmlns:a16="http://schemas.microsoft.com/office/drawing/2014/main" id="{236653BE-2550-D784-1C7C-898E6671D031}"/>
+              </a:ext>
+            </a:extLst>
+          </p:cNvPr>
+          <p:cNvSpPr>
+            <a:spLocks noGrp="1" noRot="1" noChangeAspect="1"/>
+          </p:cNvSpPr>
+          <p:nvPr>
+            <p:ph type="sldImg"/>
+          </p:nvPr>
+        </p:nvSpPr>
+        <p:spPr/>
+      </p:sp>
+      <p:sp>
+        <p:nvSpPr>
+          <p:cNvPr id="3" name="Segnaposto note 2">
+            <a:extLst>
+              <a:ext uri="{FF2B5EF4-FFF2-40B4-BE49-F238E27FC236}">
+                <a16:creationId xmlns:a16="http://schemas.microsoft.com/office/drawing/2014/main" id="{31008133-79E2-7080-8A1C-0E8360903B41}"/>
+              </a:ext>
+            </a:extLst>
+          </p:cNvPr>
+          <p:cNvSpPr>
+            <a:spLocks noGrp="1"/>
+          </p:cNvSpPr>
+          <p:nvPr>
+            <p:ph type="body" idx="1"/>
+          </p:nvPr>
+        </p:nvSpPr>
+        <p:spPr/>
+        <p:txBody>
+          <a:bodyPr/>
+          <a:lstStyle/>
+          <a:p>
+            <a:endParaRPr lang="en-US" dirty="0"/>
+          </a:p>
+        </p:txBody>
+      </p:sp>
+      <p:sp>
+        <p:nvSpPr>
+          <p:cNvPr id="4" name="Segnaposto numero diapositiva 3">
+            <a:extLst>
+              <a:ext uri="{FF2B5EF4-FFF2-40B4-BE49-F238E27FC236}">
+                <a16:creationId xmlns:a16="http://schemas.microsoft.com/office/drawing/2014/main" id="{C018B108-90B4-A15D-3F72-ACA926132CC1}"/>
+              </a:ext>
+            </a:extLst>
+          </p:cNvPr>
+          <p:cNvSpPr>
+            <a:spLocks noGrp="1"/>
+          </p:cNvSpPr>
+          <p:nvPr>
+            <p:ph type="sldNum" sz="quarter" idx="5"/>
+          </p:nvPr>
+        </p:nvSpPr>
+        <p:spPr/>
+        <p:txBody>
+          <a:bodyPr/>
+          <a:lstStyle/>
+          <a:p>
+            <a:fld id="{802E5CB9-2BE2-4860-85EE-BBFABBF2603A}" type="slidenum">
+              <a:rPr lang="en-US" smtClean="0"/>
+              <a:t>14</a:t>
+            </a:fld>
+            <a:endParaRPr lang="en-US"/>
+          </a:p>
+        </p:txBody>
+      </p:sp>
+    </p:spTree>
+    <p:extLst>
+      <p:ext uri="{BB962C8B-B14F-4D97-AF65-F5344CB8AC3E}">
+        <p14:creationId xmlns:p14="http://schemas.microsoft.com/office/powerpoint/2010/main" val="579123036"/>
+      </p:ext>
+    </p:extLst>
+  </p:cSld>
+  <p:clrMapOvr>
+    <a:masterClrMapping/>
+  </p:clrMapOvr>
+</p:notes>
+</file>
+
+<file path=ppt/notesSlides/notesSlide14.xml><?xml version="1.0" encoding="utf-8"?>
+<p:notes xmlns:a="http://schemas.openxmlformats.org/drawingml/2006/main" xmlns:r="http://schemas.openxmlformats.org/officeDocument/2006/relationships" xmlns:p="http://schemas.openxmlformats.org/presentationml/2006/main">
+  <p:cSld>
+    <p:spTree>
+      <p:nvGrpSpPr>
+        <p:cNvPr id="1" name="">
+          <a:extLst>
+            <a:ext uri="{FF2B5EF4-FFF2-40B4-BE49-F238E27FC236}">
               <a16:creationId xmlns:a16="http://schemas.microsoft.com/office/drawing/2014/main" id="{291DAF83-C1BE-DD41-C234-3BF9DCCF2D8F}"/>
             </a:ext>
           </a:extLst>
@@ -986,7 +1095,7 @@
           <a:p>
             <a:fld id="{802E5CB9-2BE2-4860-85EE-BBFABBF2603A}" type="slidenum">
               <a:rPr lang="en-US" smtClean="0"/>
-              <a:t>14</a:t>
+              <a:t>15</a:t>
             </a:fld>
             <a:endParaRPr lang="en-US" dirty="0"/>
           </a:p>
@@ -1005,7 +1114,7 @@
 </p:notes>
 </file>
 
-<file path=ppt/notesSlides/notesSlide14.xml><?xml version="1.0" encoding="utf-8"?>
+<file path=ppt/notesSlides/notesSlide15.xml><?xml version="1.0" encoding="utf-8"?>
 <p:notes xmlns:a="http://schemas.openxmlformats.org/drawingml/2006/main" xmlns:r="http://schemas.openxmlformats.org/officeDocument/2006/relationships" xmlns:p="http://schemas.openxmlformats.org/presentationml/2006/main">
   <p:cSld>
     <p:spTree>
@@ -1094,7 +1203,7 @@
           <a:p>
             <a:fld id="{802E5CB9-2BE2-4860-85EE-BBFABBF2603A}" type="slidenum">
               <a:rPr lang="en-US" smtClean="0"/>
-              <a:t>15</a:t>
+              <a:t>16</a:t>
             </a:fld>
             <a:endParaRPr lang="en-US"/>
           </a:p>
@@ -1113,7 +1222,7 @@
 </p:notes>
 </file>
 
-<file path=ppt/notesSlides/notesSlide15.xml><?xml version="1.0" encoding="utf-8"?>
+<file path=ppt/notesSlides/notesSlide16.xml><?xml version="1.0" encoding="utf-8"?>
 <p:notes xmlns:a="http://schemas.openxmlformats.org/drawingml/2006/main" xmlns:r="http://schemas.openxmlformats.org/officeDocument/2006/relationships" xmlns:p="http://schemas.openxmlformats.org/presentationml/2006/main">
   <p:cSld>
     <p:spTree>
@@ -1202,7 +1311,7 @@
           <a:p>
             <a:fld id="{802E5CB9-2BE2-4860-85EE-BBFABBF2603A}" type="slidenum">
               <a:rPr lang="en-US" smtClean="0"/>
-              <a:t>16</a:t>
+              <a:t>17</a:t>
             </a:fld>
             <a:endParaRPr lang="en-US"/>
           </a:p>
@@ -1221,7 +1330,7 @@
 </p:notes>
 </file>
 
-<file path=ppt/notesSlides/notesSlide16.xml><?xml version="1.0" encoding="utf-8"?>
+<file path=ppt/notesSlides/notesSlide17.xml><?xml version="1.0" encoding="utf-8"?>
 <p:notes xmlns:a="http://schemas.openxmlformats.org/drawingml/2006/main" xmlns:r="http://schemas.openxmlformats.org/officeDocument/2006/relationships" xmlns:p="http://schemas.openxmlformats.org/presentationml/2006/main">
   <p:cSld>
     <p:spTree>
@@ -1310,7 +1419,7 @@
           <a:p>
             <a:fld id="{802E5CB9-2BE2-4860-85EE-BBFABBF2603A}" type="slidenum">
               <a:rPr lang="en-US" smtClean="0"/>
-              <a:t>17</a:t>
+              <a:t>18</a:t>
             </a:fld>
             <a:endParaRPr lang="en-US"/>
           </a:p>
@@ -1329,7 +1438,7 @@
 </p:notes>
 </file>
 
-<file path=ppt/notesSlides/notesSlide17.xml><?xml version="1.0" encoding="utf-8"?>
+<file path=ppt/notesSlides/notesSlide18.xml><?xml version="1.0" encoding="utf-8"?>
 <p:notes xmlns:a="http://schemas.openxmlformats.org/drawingml/2006/main" xmlns:r="http://schemas.openxmlformats.org/officeDocument/2006/relationships" xmlns:p="http://schemas.openxmlformats.org/presentationml/2006/main">
   <p:cSld>
     <p:spTree>
@@ -1418,7 +1527,7 @@
           <a:p>
             <a:fld id="{802E5CB9-2BE2-4860-85EE-BBFABBF2603A}" type="slidenum">
               <a:rPr lang="en-US" smtClean="0"/>
-              <a:t>18</a:t>
+              <a:t>19</a:t>
             </a:fld>
             <a:endParaRPr lang="en-US"/>
           </a:p>
@@ -1437,7 +1546,7 @@
 </p:notes>
 </file>
 
-<file path=ppt/notesSlides/notesSlide18.xml><?xml version="1.0" encoding="utf-8"?>
+<file path=ppt/notesSlides/notesSlide19.xml><?xml version="1.0" encoding="utf-8"?>
 <p:notes xmlns:a="http://schemas.openxmlformats.org/drawingml/2006/main" xmlns:r="http://schemas.openxmlformats.org/officeDocument/2006/relationships" xmlns:p="http://schemas.openxmlformats.org/presentationml/2006/main">
   <p:cSld>
     <p:spTree>
@@ -1526,7 +1635,7 @@
           <a:p>
             <a:fld id="{802E5CB9-2BE2-4860-85EE-BBFABBF2603A}" type="slidenum">
               <a:rPr lang="en-US" smtClean="0"/>
-              <a:t>19</a:t>
+              <a:t>20</a:t>
             </a:fld>
             <a:endParaRPr lang="en-US"/>
           </a:p>
@@ -1536,114 +1645,6 @@
     <p:extLst>
       <p:ext uri="{BB962C8B-B14F-4D97-AF65-F5344CB8AC3E}">
         <p14:creationId xmlns:p14="http://schemas.microsoft.com/office/powerpoint/2010/main" val="3625022151"/>
-      </p:ext>
-    </p:extLst>
-  </p:cSld>
-  <p:clrMapOvr>
-    <a:masterClrMapping/>
-  </p:clrMapOvr>
-</p:notes>
-</file>
-
-<file path=ppt/notesSlides/notesSlide19.xml><?xml version="1.0" encoding="utf-8"?>
-<p:notes xmlns:a="http://schemas.openxmlformats.org/drawingml/2006/main" xmlns:r="http://schemas.openxmlformats.org/officeDocument/2006/relationships" xmlns:p="http://schemas.openxmlformats.org/presentationml/2006/main">
-  <p:cSld>
-    <p:spTree>
-      <p:nvGrpSpPr>
-        <p:cNvPr id="1" name="">
-          <a:extLst>
-            <a:ext uri="{FF2B5EF4-FFF2-40B4-BE49-F238E27FC236}">
-              <a16:creationId xmlns:a16="http://schemas.microsoft.com/office/drawing/2014/main" id="{5F8E2A9A-3EBF-8357-7310-33D60FB5B5F9}"/>
-            </a:ext>
-          </a:extLst>
-        </p:cNvPr>
-        <p:cNvGrpSpPr/>
-        <p:nvPr/>
-      </p:nvGrpSpPr>
-      <p:grpSpPr>
-        <a:xfrm>
-          <a:off x="0" y="0"/>
-          <a:ext cx="0" cy="0"/>
-          <a:chOff x="0" y="0"/>
-          <a:chExt cx="0" cy="0"/>
-        </a:xfrm>
-      </p:grpSpPr>
-      <p:sp>
-        <p:nvSpPr>
-          <p:cNvPr id="2" name="Segnaposto immagine diapositiva 1">
-            <a:extLst>
-              <a:ext uri="{FF2B5EF4-FFF2-40B4-BE49-F238E27FC236}">
-                <a16:creationId xmlns:a16="http://schemas.microsoft.com/office/drawing/2014/main" id="{7EF695BF-DA78-4207-5436-D34401A1332E}"/>
-              </a:ext>
-            </a:extLst>
-          </p:cNvPr>
-          <p:cNvSpPr>
-            <a:spLocks noGrp="1" noRot="1" noChangeAspect="1"/>
-          </p:cNvSpPr>
-          <p:nvPr>
-            <p:ph type="sldImg"/>
-          </p:nvPr>
-        </p:nvSpPr>
-        <p:spPr/>
-      </p:sp>
-      <p:sp>
-        <p:nvSpPr>
-          <p:cNvPr id="3" name="Segnaposto note 2">
-            <a:extLst>
-              <a:ext uri="{FF2B5EF4-FFF2-40B4-BE49-F238E27FC236}">
-                <a16:creationId xmlns:a16="http://schemas.microsoft.com/office/drawing/2014/main" id="{933E2A72-630A-1429-2A71-9FBB4D31BD17}"/>
-              </a:ext>
-            </a:extLst>
-          </p:cNvPr>
-          <p:cNvSpPr>
-            <a:spLocks noGrp="1"/>
-          </p:cNvSpPr>
-          <p:nvPr>
-            <p:ph type="body" idx="1"/>
-          </p:nvPr>
-        </p:nvSpPr>
-        <p:spPr/>
-        <p:txBody>
-          <a:bodyPr/>
-          <a:lstStyle/>
-          <a:p>
-            <a:endParaRPr lang="en-US" dirty="0"/>
-          </a:p>
-        </p:txBody>
-      </p:sp>
-      <p:sp>
-        <p:nvSpPr>
-          <p:cNvPr id="4" name="Segnaposto numero diapositiva 3">
-            <a:extLst>
-              <a:ext uri="{FF2B5EF4-FFF2-40B4-BE49-F238E27FC236}">
-                <a16:creationId xmlns:a16="http://schemas.microsoft.com/office/drawing/2014/main" id="{7E45F230-FDD7-C076-18B3-6C9D1B2722DC}"/>
-              </a:ext>
-            </a:extLst>
-          </p:cNvPr>
-          <p:cNvSpPr>
-            <a:spLocks noGrp="1"/>
-          </p:cNvSpPr>
-          <p:nvPr>
-            <p:ph type="sldNum" sz="quarter" idx="5"/>
-          </p:nvPr>
-        </p:nvSpPr>
-        <p:spPr/>
-        <p:txBody>
-          <a:bodyPr/>
-          <a:lstStyle/>
-          <a:p>
-            <a:fld id="{802E5CB9-2BE2-4860-85EE-BBFABBF2603A}" type="slidenum">
-              <a:rPr lang="en-US" smtClean="0"/>
-              <a:t>20</a:t>
-            </a:fld>
-            <a:endParaRPr lang="en-US"/>
-          </a:p>
-        </p:txBody>
-      </p:sp>
-    </p:spTree>
-    <p:extLst>
-      <p:ext uri="{BB962C8B-B14F-4D97-AF65-F5344CB8AC3E}">
-        <p14:creationId xmlns:p14="http://schemas.microsoft.com/office/powerpoint/2010/main" val="1803762023"/>
       </p:ext>
     </p:extLst>
   </p:cSld>
@@ -1769,6 +1770,114 @@
         <p:cNvPr id="1" name="">
           <a:extLst>
             <a:ext uri="{FF2B5EF4-FFF2-40B4-BE49-F238E27FC236}">
+              <a16:creationId xmlns:a16="http://schemas.microsoft.com/office/drawing/2014/main" id="{5F8E2A9A-3EBF-8357-7310-33D60FB5B5F9}"/>
+            </a:ext>
+          </a:extLst>
+        </p:cNvPr>
+        <p:cNvGrpSpPr/>
+        <p:nvPr/>
+      </p:nvGrpSpPr>
+      <p:grpSpPr>
+        <a:xfrm>
+          <a:off x="0" y="0"/>
+          <a:ext cx="0" cy="0"/>
+          <a:chOff x="0" y="0"/>
+          <a:chExt cx="0" cy="0"/>
+        </a:xfrm>
+      </p:grpSpPr>
+      <p:sp>
+        <p:nvSpPr>
+          <p:cNvPr id="2" name="Segnaposto immagine diapositiva 1">
+            <a:extLst>
+              <a:ext uri="{FF2B5EF4-FFF2-40B4-BE49-F238E27FC236}">
+                <a16:creationId xmlns:a16="http://schemas.microsoft.com/office/drawing/2014/main" id="{7EF695BF-DA78-4207-5436-D34401A1332E}"/>
+              </a:ext>
+            </a:extLst>
+          </p:cNvPr>
+          <p:cNvSpPr>
+            <a:spLocks noGrp="1" noRot="1" noChangeAspect="1"/>
+          </p:cNvSpPr>
+          <p:nvPr>
+            <p:ph type="sldImg"/>
+          </p:nvPr>
+        </p:nvSpPr>
+        <p:spPr/>
+      </p:sp>
+      <p:sp>
+        <p:nvSpPr>
+          <p:cNvPr id="3" name="Segnaposto note 2">
+            <a:extLst>
+              <a:ext uri="{FF2B5EF4-FFF2-40B4-BE49-F238E27FC236}">
+                <a16:creationId xmlns:a16="http://schemas.microsoft.com/office/drawing/2014/main" id="{933E2A72-630A-1429-2A71-9FBB4D31BD17}"/>
+              </a:ext>
+            </a:extLst>
+          </p:cNvPr>
+          <p:cNvSpPr>
+            <a:spLocks noGrp="1"/>
+          </p:cNvSpPr>
+          <p:nvPr>
+            <p:ph type="body" idx="1"/>
+          </p:nvPr>
+        </p:nvSpPr>
+        <p:spPr/>
+        <p:txBody>
+          <a:bodyPr/>
+          <a:lstStyle/>
+          <a:p>
+            <a:endParaRPr lang="en-US" dirty="0"/>
+          </a:p>
+        </p:txBody>
+      </p:sp>
+      <p:sp>
+        <p:nvSpPr>
+          <p:cNvPr id="4" name="Segnaposto numero diapositiva 3">
+            <a:extLst>
+              <a:ext uri="{FF2B5EF4-FFF2-40B4-BE49-F238E27FC236}">
+                <a16:creationId xmlns:a16="http://schemas.microsoft.com/office/drawing/2014/main" id="{7E45F230-FDD7-C076-18B3-6C9D1B2722DC}"/>
+              </a:ext>
+            </a:extLst>
+          </p:cNvPr>
+          <p:cNvSpPr>
+            <a:spLocks noGrp="1"/>
+          </p:cNvSpPr>
+          <p:nvPr>
+            <p:ph type="sldNum" sz="quarter" idx="5"/>
+          </p:nvPr>
+        </p:nvSpPr>
+        <p:spPr/>
+        <p:txBody>
+          <a:bodyPr/>
+          <a:lstStyle/>
+          <a:p>
+            <a:fld id="{802E5CB9-2BE2-4860-85EE-BBFABBF2603A}" type="slidenum">
+              <a:rPr lang="en-US" smtClean="0"/>
+              <a:t>21</a:t>
+            </a:fld>
+            <a:endParaRPr lang="en-US"/>
+          </a:p>
+        </p:txBody>
+      </p:sp>
+    </p:spTree>
+    <p:extLst>
+      <p:ext uri="{BB962C8B-B14F-4D97-AF65-F5344CB8AC3E}">
+        <p14:creationId xmlns:p14="http://schemas.microsoft.com/office/powerpoint/2010/main" val="1803762023"/>
+      </p:ext>
+    </p:extLst>
+  </p:cSld>
+  <p:clrMapOvr>
+    <a:masterClrMapping/>
+  </p:clrMapOvr>
+</p:notes>
+</file>
+
+<file path=ppt/notesSlides/notesSlide21.xml><?xml version="1.0" encoding="utf-8"?>
+<p:notes xmlns:a="http://schemas.openxmlformats.org/drawingml/2006/main" xmlns:r="http://schemas.openxmlformats.org/officeDocument/2006/relationships" xmlns:p="http://schemas.openxmlformats.org/presentationml/2006/main">
+  <p:cSld>
+    <p:spTree>
+      <p:nvGrpSpPr>
+        <p:cNvPr id="1" name="">
+          <a:extLst>
+            <a:ext uri="{FF2B5EF4-FFF2-40B4-BE49-F238E27FC236}">
               <a16:creationId xmlns:a16="http://schemas.microsoft.com/office/drawing/2014/main" id="{72FEFD59-4314-5C46-CD1E-8C45307F0CF7}"/>
             </a:ext>
           </a:extLst>
@@ -1850,7 +1959,7 @@
           <a:p>
             <a:fld id="{802E5CB9-2BE2-4860-85EE-BBFABBF2603A}" type="slidenum">
               <a:rPr lang="en-US" smtClean="0"/>
-              <a:t>21</a:t>
+              <a:t>22</a:t>
             </a:fld>
             <a:endParaRPr lang="en-US"/>
           </a:p>
@@ -1869,7 +1978,7 @@
 </p:notes>
 </file>
 
-<file path=ppt/notesSlides/notesSlide21.xml><?xml version="1.0" encoding="utf-8"?>
+<file path=ppt/notesSlides/notesSlide22.xml><?xml version="1.0" encoding="utf-8"?>
 <p:notes xmlns:a="http://schemas.openxmlformats.org/drawingml/2006/main" xmlns:r="http://schemas.openxmlformats.org/officeDocument/2006/relationships" xmlns:p="http://schemas.openxmlformats.org/presentationml/2006/main">
   <p:cSld>
     <p:spTree>
@@ -1958,7 +2067,7 @@
           <a:p>
             <a:fld id="{802E5CB9-2BE2-4860-85EE-BBFABBF2603A}" type="slidenum">
               <a:rPr lang="en-US" smtClean="0"/>
-              <a:t>22</a:t>
+              <a:t>23</a:t>
             </a:fld>
             <a:endParaRPr lang="en-US"/>
           </a:p>
@@ -1977,7 +2086,7 @@
 </p:notes>
 </file>
 
-<file path=ppt/notesSlides/notesSlide22.xml><?xml version="1.0" encoding="utf-8"?>
+<file path=ppt/notesSlides/notesSlide23.xml><?xml version="1.0" encoding="utf-8"?>
 <p:notes xmlns:a="http://schemas.openxmlformats.org/drawingml/2006/main" xmlns:r="http://schemas.openxmlformats.org/officeDocument/2006/relationships" xmlns:p="http://schemas.openxmlformats.org/presentationml/2006/main">
   <p:cSld>
     <p:spTree>
@@ -2066,7 +2175,7 @@
           <a:p>
             <a:fld id="{802E5CB9-2BE2-4860-85EE-BBFABBF2603A}" type="slidenum">
               <a:rPr lang="en-US" smtClean="0"/>
-              <a:t>23</a:t>
+              <a:t>24</a:t>
             </a:fld>
             <a:endParaRPr lang="en-US"/>
           </a:p>
@@ -2085,7 +2194,7 @@
 </p:notes>
 </file>
 
-<file path=ppt/notesSlides/notesSlide23.xml><?xml version="1.0" encoding="utf-8"?>
+<file path=ppt/notesSlides/notesSlide24.xml><?xml version="1.0" encoding="utf-8"?>
 <p:notes xmlns:a="http://schemas.openxmlformats.org/drawingml/2006/main" xmlns:r="http://schemas.openxmlformats.org/officeDocument/2006/relationships" xmlns:p="http://schemas.openxmlformats.org/presentationml/2006/main">
   <p:cSld>
     <p:spTree>
@@ -2174,7 +2283,7 @@
           <a:p>
             <a:fld id="{802E5CB9-2BE2-4860-85EE-BBFABBF2603A}" type="slidenum">
               <a:rPr lang="en-US" smtClean="0"/>
-              <a:t>24</a:t>
+              <a:t>25</a:t>
             </a:fld>
             <a:endParaRPr lang="en-US"/>
           </a:p>
@@ -2193,7 +2302,7 @@
 </p:notes>
 </file>
 
-<file path=ppt/notesSlides/notesSlide24.xml><?xml version="1.0" encoding="utf-8"?>
+<file path=ppt/notesSlides/notesSlide25.xml><?xml version="1.0" encoding="utf-8"?>
 <p:notes xmlns:a="http://schemas.openxmlformats.org/drawingml/2006/main" xmlns:r="http://schemas.openxmlformats.org/officeDocument/2006/relationships" xmlns:p="http://schemas.openxmlformats.org/presentationml/2006/main">
   <p:cSld>
     <p:spTree>
@@ -2282,7 +2391,7 @@
           <a:p>
             <a:fld id="{802E5CB9-2BE2-4860-85EE-BBFABBF2603A}" type="slidenum">
               <a:rPr lang="en-US" smtClean="0"/>
-              <a:t>25</a:t>
+              <a:t>26</a:t>
             </a:fld>
             <a:endParaRPr lang="en-US" dirty="0"/>
           </a:p>
@@ -2301,7 +2410,7 @@
 </p:notes>
 </file>
 
-<file path=ppt/notesSlides/notesSlide25.xml><?xml version="1.0" encoding="utf-8"?>
+<file path=ppt/notesSlides/notesSlide26.xml><?xml version="1.0" encoding="utf-8"?>
 <p:notes xmlns:a="http://schemas.openxmlformats.org/drawingml/2006/main" xmlns:r="http://schemas.openxmlformats.org/officeDocument/2006/relationships" xmlns:p="http://schemas.openxmlformats.org/presentationml/2006/main">
   <p:cSld>
     <p:spTree>
@@ -2390,7 +2499,7 @@
           <a:p>
             <a:fld id="{802E5CB9-2BE2-4860-85EE-BBFABBF2603A}" type="slidenum">
               <a:rPr lang="en-US" smtClean="0"/>
-              <a:t>26</a:t>
+              <a:t>27</a:t>
             </a:fld>
             <a:endParaRPr lang="en-US"/>
           </a:p>
@@ -8050,7 +8159,7 @@
             </a:r>
             <a:r>
               <a:rPr lang="en-US" sz="1400" dirty="0"/>
-              <a:t> set as a multiple of the SD of the segment, by trial and errors fixed at 6 times SD</a:t>
+              <a:t> set as a multiple of the SD of the segment, by trial and errors fixed at 5 times SD</a:t>
             </a:r>
           </a:p>
           <a:p>
@@ -8795,7 +8904,19 @@
             </a:r>
             <a:r>
               <a:rPr lang="en-GB" sz="1200" dirty="0"/>
-              <a:t> (e.g. noisy record), because the first condition is “does the signal don’t have a ventricular peak”.</a:t>
+              <a:t> (e.g. noisy record), because the condition “</a:t>
+            </a:r>
+            <a:r>
+              <a:rPr lang="en-GB" sz="1200" dirty="0">
+                <a:solidFill>
+                  <a:schemeClr val="tx1"/>
+                </a:solidFill>
+              </a:rPr>
+              <a:t>Is the ventricular peak absent (nan)? </a:t>
+            </a:r>
+            <a:r>
+              <a:rPr lang="en-GB" sz="1200" dirty="0"/>
+              <a:t>”.</a:t>
             </a:r>
           </a:p>
           <a:p>
@@ -8981,7 +9102,7 @@
                     <a:schemeClr val="tx1"/>
                   </a:solidFill>
                 </a:rPr>
-                <a:t>Does the signal don’t a ventricular  peak? </a:t>
+                <a:t>Is the ventricular peak absent (nan)? </a:t>
               </a:r>
             </a:p>
           </p:txBody>
@@ -9344,7 +9465,7 @@
         </p:blipFill>
         <p:spPr>
           <a:xfrm>
-            <a:off x="579120" y="3970127"/>
+            <a:off x="1342395" y="3942695"/>
             <a:ext cx="5113269" cy="724000"/>
           </a:xfrm>
           <a:prstGeom prst="rect">
@@ -9373,7 +9494,7 @@
         </p:blipFill>
         <p:spPr>
           <a:xfrm>
-            <a:off x="578871" y="4694126"/>
+            <a:off x="1342146" y="4666694"/>
             <a:ext cx="5113269" cy="849731"/>
           </a:xfrm>
           <a:prstGeom prst="rect">
@@ -9403,7 +9524,7 @@
         </p:blipFill>
         <p:spPr>
           <a:xfrm>
-            <a:off x="578870" y="5607865"/>
+            <a:off x="1342145" y="5580433"/>
             <a:ext cx="5113269" cy="708721"/>
           </a:xfrm>
           <a:prstGeom prst="rect">
@@ -9425,8 +9546,8 @@
         </p:nvSpPr>
         <p:spPr>
           <a:xfrm>
-            <a:off x="9022080" y="5066857"/>
-            <a:ext cx="2331720" cy="1082015"/>
+            <a:off x="6576090" y="5702580"/>
+            <a:ext cx="2864580" cy="464426"/>
           </a:xfrm>
           <a:prstGeom prst="roundRect">
             <a:avLst/>
@@ -9451,15 +9572,15 @@
           <a:lstStyle/>
           <a:p>
             <a:r>
-              <a:rPr lang="en-GB" sz="1600" dirty="0"/>
+              <a:rPr lang="en-GB" sz="1200" dirty="0"/>
               <a:t>NB: if </a:t>
             </a:r>
             <a:r>
-              <a:rPr lang="en-GB" sz="1600" dirty="0" err="1"/>
+              <a:rPr lang="en-GB" sz="1200" dirty="0" err="1"/>
               <a:t>find_peaks</a:t>
             </a:r>
             <a:r>
-              <a:rPr lang="en-GB" sz="1600" dirty="0"/>
+              <a:rPr lang="en-GB" sz="1200" dirty="0"/>
               <a:t> return [], the algorithm will assign nan value to the peak</a:t>
             </a:r>
           </a:p>
@@ -9492,8 +9613,8 @@
         </p:blipFill>
         <p:spPr>
           <a:xfrm>
-            <a:off x="8831835" y="1584520"/>
-            <a:ext cx="2521965" cy="2539424"/>
+            <a:off x="9249515" y="1581945"/>
+            <a:ext cx="2665196" cy="2683646"/>
           </a:xfrm>
           <a:prstGeom prst="rect">
             <a:avLst/>
@@ -9521,6 +9642,992 @@
         <p:cNvPr id="1" name="">
           <a:extLst>
             <a:ext uri="{FF2B5EF4-FFF2-40B4-BE49-F238E27FC236}">
+              <a16:creationId xmlns:a16="http://schemas.microsoft.com/office/drawing/2014/main" id="{77E1989D-2F0E-98E7-D9D4-6E2B119EB4AD}"/>
+            </a:ext>
+          </a:extLst>
+        </p:cNvPr>
+        <p:cNvGrpSpPr/>
+        <p:nvPr/>
+      </p:nvGrpSpPr>
+      <p:grpSpPr>
+        <a:xfrm>
+          <a:off x="0" y="0"/>
+          <a:ext cx="0" cy="0"/>
+          <a:chOff x="0" y="0"/>
+          <a:chExt cx="0" cy="0"/>
+        </a:xfrm>
+      </p:grpSpPr>
+      <p:sp>
+        <p:nvSpPr>
+          <p:cNvPr id="2" name="Titolo 1">
+            <a:extLst>
+              <a:ext uri="{FF2B5EF4-FFF2-40B4-BE49-F238E27FC236}">
+                <a16:creationId xmlns:a16="http://schemas.microsoft.com/office/drawing/2014/main" id="{2A488431-176A-A490-C161-A691EC0979E3}"/>
+              </a:ext>
+            </a:extLst>
+          </p:cNvPr>
+          <p:cNvSpPr>
+            <a:spLocks noGrp="1"/>
+          </p:cNvSpPr>
+          <p:nvPr>
+            <p:ph type="title"/>
+          </p:nvPr>
+        </p:nvSpPr>
+        <p:spPr>
+          <a:xfrm>
+            <a:off x="838200" y="209292"/>
+            <a:ext cx="9905460" cy="971551"/>
+          </a:xfrm>
+        </p:spPr>
+        <p:txBody>
+          <a:bodyPr>
+            <a:normAutofit/>
+          </a:bodyPr>
+          <a:lstStyle/>
+          <a:p>
+            <a:r>
+              <a:rPr lang="en-US" sz="3600" dirty="0"/>
+              <a:t>Code functioning</a:t>
+            </a:r>
+          </a:p>
+        </p:txBody>
+      </p:sp>
+      <p:sp>
+        <p:nvSpPr>
+          <p:cNvPr id="4" name="Segnaposto numero diapositiva 3">
+            <a:extLst>
+              <a:ext uri="{FF2B5EF4-FFF2-40B4-BE49-F238E27FC236}">
+                <a16:creationId xmlns:a16="http://schemas.microsoft.com/office/drawing/2014/main" id="{34ADCB7D-34CB-E469-22C8-4390B05951A8}"/>
+              </a:ext>
+            </a:extLst>
+          </p:cNvPr>
+          <p:cNvSpPr>
+            <a:spLocks noGrp="1"/>
+          </p:cNvSpPr>
+          <p:nvPr>
+            <p:ph type="sldNum" sz="quarter" idx="12"/>
+          </p:nvPr>
+        </p:nvSpPr>
+        <p:spPr/>
+        <p:txBody>
+          <a:bodyPr/>
+          <a:lstStyle/>
+          <a:p>
+            <a:fld id="{2FA0223F-D95A-431D-9A71-EDA7FA0C2F5B}" type="slidenum">
+              <a:rPr lang="en-US" smtClean="0"/>
+              <a:t>14</a:t>
+            </a:fld>
+            <a:endParaRPr lang="en-US"/>
+          </a:p>
+        </p:txBody>
+      </p:sp>
+      <p:sp>
+        <p:nvSpPr>
+          <p:cNvPr id="27" name="Rettangolo 26">
+            <a:extLst>
+              <a:ext uri="{FF2B5EF4-FFF2-40B4-BE49-F238E27FC236}">
+                <a16:creationId xmlns:a16="http://schemas.microsoft.com/office/drawing/2014/main" id="{18AFCE32-1913-A3B8-8DBF-3AC223485BFB}"/>
+              </a:ext>
+            </a:extLst>
+          </p:cNvPr>
+          <p:cNvSpPr/>
+          <p:nvPr/>
+        </p:nvSpPr>
+        <p:spPr>
+          <a:xfrm>
+            <a:off x="6723157" y="1812745"/>
+            <a:ext cx="206547" cy="168094"/>
+          </a:xfrm>
+          <a:prstGeom prst="rect">
+            <a:avLst/>
+          </a:prstGeom>
+          <a:solidFill>
+            <a:schemeClr val="bg1"/>
+          </a:solidFill>
+          <a:ln>
+            <a:solidFill>
+              <a:schemeClr val="bg1"/>
+            </a:solidFill>
+          </a:ln>
+        </p:spPr>
+        <p:style>
+          <a:lnRef idx="2">
+            <a:schemeClr val="accent1">
+              <a:shade val="15000"/>
+            </a:schemeClr>
+          </a:lnRef>
+          <a:fillRef idx="1">
+            <a:schemeClr val="accent1"/>
+          </a:fillRef>
+          <a:effectRef idx="0">
+            <a:schemeClr val="accent1"/>
+          </a:effectRef>
+          <a:fontRef idx="minor">
+            <a:schemeClr val="lt1"/>
+          </a:fontRef>
+        </p:style>
+        <p:txBody>
+          <a:bodyPr rtlCol="0" anchor="ctr"/>
+          <a:lstStyle/>
+          <a:p>
+            <a:pPr algn="ctr"/>
+            <a:endParaRPr lang="it-IT"/>
+          </a:p>
+        </p:txBody>
+      </p:sp>
+      <p:sp>
+        <p:nvSpPr>
+          <p:cNvPr id="12" name="Rettangolo 11">
+            <a:extLst>
+              <a:ext uri="{FF2B5EF4-FFF2-40B4-BE49-F238E27FC236}">
+                <a16:creationId xmlns:a16="http://schemas.microsoft.com/office/drawing/2014/main" id="{5AEC1996-B703-CB6E-0F0A-FCECFB2342D5}"/>
+              </a:ext>
+            </a:extLst>
+          </p:cNvPr>
+          <p:cNvSpPr/>
+          <p:nvPr/>
+        </p:nvSpPr>
+        <p:spPr>
+          <a:xfrm>
+            <a:off x="5468844" y="2179320"/>
+            <a:ext cx="223296" cy="160020"/>
+          </a:xfrm>
+          <a:prstGeom prst="rect">
+            <a:avLst/>
+          </a:prstGeom>
+          <a:solidFill>
+            <a:schemeClr val="bg1"/>
+          </a:solidFill>
+          <a:ln>
+            <a:solidFill>
+              <a:schemeClr val="bg1"/>
+            </a:solidFill>
+          </a:ln>
+        </p:spPr>
+        <p:style>
+          <a:lnRef idx="2">
+            <a:schemeClr val="accent1">
+              <a:shade val="15000"/>
+            </a:schemeClr>
+          </a:lnRef>
+          <a:fillRef idx="1">
+            <a:schemeClr val="accent1"/>
+          </a:fillRef>
+          <a:effectRef idx="0">
+            <a:schemeClr val="accent1"/>
+          </a:effectRef>
+          <a:fontRef idx="minor">
+            <a:schemeClr val="lt1"/>
+          </a:fontRef>
+        </p:style>
+        <p:txBody>
+          <a:bodyPr rtlCol="0" anchor="ctr"/>
+          <a:lstStyle/>
+          <a:p>
+            <a:pPr algn="ctr"/>
+            <a:endParaRPr lang="it-IT"/>
+          </a:p>
+        </p:txBody>
+      </p:sp>
+      <p:pic>
+        <p:nvPicPr>
+          <p:cNvPr id="16" name="Immagine 15">
+            <a:extLst>
+              <a:ext uri="{FF2B5EF4-FFF2-40B4-BE49-F238E27FC236}">
+                <a16:creationId xmlns:a16="http://schemas.microsoft.com/office/drawing/2014/main" id="{FE9C53F0-2314-25AA-0D7D-D2BD6684B826}"/>
+              </a:ext>
+            </a:extLst>
+          </p:cNvPr>
+          <p:cNvPicPr>
+            <a:picLocks noChangeAspect="1"/>
+          </p:cNvPicPr>
+          <p:nvPr/>
+        </p:nvPicPr>
+        <p:blipFill>
+          <a:blip r:embed="rId3"/>
+          <a:stretch>
+            <a:fillRect/>
+          </a:stretch>
+        </p:blipFill>
+        <p:spPr>
+          <a:xfrm>
+            <a:off x="118872" y="1534702"/>
+            <a:ext cx="3680779" cy="213378"/>
+          </a:xfrm>
+          <a:prstGeom prst="rect">
+            <a:avLst/>
+          </a:prstGeom>
+        </p:spPr>
+      </p:pic>
+      <p:sp>
+        <p:nvSpPr>
+          <p:cNvPr id="17" name="Segnaposto contenuto 2">
+            <a:extLst>
+              <a:ext uri="{FF2B5EF4-FFF2-40B4-BE49-F238E27FC236}">
+                <a16:creationId xmlns:a16="http://schemas.microsoft.com/office/drawing/2014/main" id="{E5444CA8-BD44-E722-6574-51D538417706}"/>
+              </a:ext>
+            </a:extLst>
+          </p:cNvPr>
+          <p:cNvSpPr>
+            <a:spLocks noGrp="1"/>
+          </p:cNvSpPr>
+          <p:nvPr>
+            <p:ph idx="1"/>
+          </p:nvPr>
+        </p:nvSpPr>
+        <p:spPr>
+          <a:xfrm>
+            <a:off x="2909262" y="1891632"/>
+            <a:ext cx="4824381" cy="4302840"/>
+          </a:xfrm>
+        </p:spPr>
+        <p:txBody>
+          <a:bodyPr>
+            <a:noAutofit/>
+          </a:bodyPr>
+          <a:lstStyle/>
+          <a:p>
+            <a:pPr marL="342900" indent="-342900">
+              <a:buFont typeface="+mj-lt"/>
+              <a:buAutoNum type="arabicPeriod"/>
+            </a:pPr>
+            <a:r>
+              <a:rPr lang="en-US" sz="1200" dirty="0"/>
+              <a:t>The given </a:t>
+            </a:r>
+            <a:r>
+              <a:rPr lang="en-US" sz="1200" dirty="0">
+                <a:solidFill>
+                  <a:srgbClr val="00B0F0"/>
+                </a:solidFill>
+              </a:rPr>
+              <a:t>record</a:t>
+            </a:r>
+            <a:r>
+              <a:rPr lang="en-US" sz="1200" dirty="0"/>
+              <a:t> is divided into three segments and the </a:t>
+            </a:r>
+            <a:r>
+              <a:rPr lang="en-US" sz="1200" dirty="0">
+                <a:solidFill>
+                  <a:srgbClr val="7030A0"/>
+                </a:solidFill>
+              </a:rPr>
+              <a:t>modulus</a:t>
+            </a:r>
+            <a:r>
+              <a:rPr lang="en-US" sz="1200" dirty="0"/>
+              <a:t> is taken</a:t>
+            </a:r>
+          </a:p>
+          <a:p>
+            <a:pPr marL="800100" lvl="1" indent="-342900">
+              <a:buFont typeface="+mj-lt"/>
+              <a:buAutoNum type="arabicPeriod"/>
+            </a:pPr>
+            <a:r>
+              <a:rPr lang="en-US" sz="1050" dirty="0"/>
+              <a:t>Atrial phase: </a:t>
+            </a:r>
+            <a:r>
+              <a:rPr lang="en-US" sz="1050" dirty="0">
+                <a:solidFill>
+                  <a:srgbClr val="7030A0"/>
+                </a:solidFill>
+              </a:rPr>
+              <a:t>abs</a:t>
+            </a:r>
+            <a:r>
+              <a:rPr lang="en-US" sz="1050" dirty="0"/>
+              <a:t>(</a:t>
+            </a:r>
+            <a:r>
+              <a:rPr lang="en-US" sz="1050" dirty="0">
+                <a:solidFill>
+                  <a:srgbClr val="00B0F0"/>
+                </a:solidFill>
+              </a:rPr>
+              <a:t>record</a:t>
+            </a:r>
+            <a:r>
+              <a:rPr lang="en-US" sz="1050" dirty="0"/>
+              <a:t>[t=0 : t=</a:t>
+            </a:r>
+            <a:r>
+              <a:rPr lang="en-US" sz="1050" dirty="0">
+                <a:solidFill>
+                  <a:srgbClr val="0070C0"/>
+                </a:solidFill>
+              </a:rPr>
+              <a:t>0.35</a:t>
+            </a:r>
+            <a:r>
+              <a:rPr lang="en-US" sz="1050" dirty="0"/>
+              <a:t>])</a:t>
+            </a:r>
+          </a:p>
+          <a:p>
+            <a:pPr marL="800100" lvl="1" indent="-342900">
+              <a:buFont typeface="+mj-lt"/>
+              <a:buAutoNum type="arabicPeriod"/>
+            </a:pPr>
+            <a:r>
+              <a:rPr lang="en-US" sz="1050" dirty="0"/>
+              <a:t>Ventricular phase: </a:t>
+            </a:r>
+            <a:r>
+              <a:rPr lang="en-US" sz="1050" dirty="0">
+                <a:solidFill>
+                  <a:srgbClr val="7030A0"/>
+                </a:solidFill>
+              </a:rPr>
+              <a:t>abs</a:t>
+            </a:r>
+            <a:r>
+              <a:rPr lang="en-US" sz="1050" dirty="0"/>
+              <a:t>(</a:t>
+            </a:r>
+            <a:r>
+              <a:rPr lang="en-US" sz="1050" dirty="0">
+                <a:solidFill>
+                  <a:srgbClr val="00B0F0"/>
+                </a:solidFill>
+              </a:rPr>
+              <a:t>record</a:t>
+            </a:r>
+            <a:r>
+              <a:rPr lang="en-US" sz="1050" dirty="0"/>
+              <a:t>[t=</a:t>
+            </a:r>
+            <a:r>
+              <a:rPr lang="en-US" sz="1050" dirty="0">
+                <a:solidFill>
+                  <a:schemeClr val="accent6">
+                    <a:lumMod val="75000"/>
+                  </a:schemeClr>
+                </a:solidFill>
+              </a:rPr>
+              <a:t>0.45</a:t>
+            </a:r>
+            <a:r>
+              <a:rPr lang="en-US" sz="1050" dirty="0"/>
+              <a:t> : t=</a:t>
+            </a:r>
+            <a:r>
+              <a:rPr lang="en-US" sz="1050" dirty="0" err="1"/>
+              <a:t>t_end</a:t>
+            </a:r>
+            <a:r>
+              <a:rPr lang="en-US" sz="1050" dirty="0"/>
+              <a:t>])</a:t>
+            </a:r>
+          </a:p>
+          <a:p>
+            <a:pPr marL="800100" lvl="1" indent="-342900">
+              <a:buFont typeface="+mj-lt"/>
+              <a:buAutoNum type="arabicPeriod"/>
+            </a:pPr>
+            <a:r>
+              <a:rPr lang="en-US" sz="1050" dirty="0"/>
+              <a:t>His phase: </a:t>
+            </a:r>
+            <a:r>
+              <a:rPr lang="en-US" sz="1050" dirty="0">
+                <a:solidFill>
+                  <a:srgbClr val="7030A0"/>
+                </a:solidFill>
+              </a:rPr>
+              <a:t>abs</a:t>
+            </a:r>
+            <a:r>
+              <a:rPr lang="en-US" sz="1050" dirty="0"/>
+              <a:t>(</a:t>
+            </a:r>
+            <a:r>
+              <a:rPr lang="en-US" sz="1050" dirty="0">
+                <a:solidFill>
+                  <a:srgbClr val="00B0F0"/>
+                </a:solidFill>
+              </a:rPr>
+              <a:t>record</a:t>
+            </a:r>
+            <a:r>
+              <a:rPr lang="en-US" sz="1050" dirty="0"/>
+              <a:t>[t=</a:t>
+            </a:r>
+            <a:r>
+              <a:rPr lang="en-US" sz="1050" dirty="0">
+                <a:solidFill>
+                  <a:srgbClr val="0070C0"/>
+                </a:solidFill>
+              </a:rPr>
+              <a:t>0.35</a:t>
+            </a:r>
+            <a:r>
+              <a:rPr lang="en-US" sz="1050" dirty="0"/>
+              <a:t> : t=</a:t>
+            </a:r>
+            <a:r>
+              <a:rPr lang="en-US" sz="1050" dirty="0">
+                <a:solidFill>
+                  <a:schemeClr val="accent6">
+                    <a:lumMod val="75000"/>
+                  </a:schemeClr>
+                </a:solidFill>
+              </a:rPr>
+              <a:t>0.45</a:t>
+            </a:r>
+            <a:r>
+              <a:rPr lang="en-US" sz="1050" dirty="0"/>
+              <a:t>])</a:t>
+            </a:r>
+          </a:p>
+          <a:p>
+            <a:pPr marL="342900" indent="-342900">
+              <a:buFont typeface="+mj-lt"/>
+              <a:buAutoNum type="arabicPeriod"/>
+            </a:pPr>
+            <a:r>
+              <a:rPr lang="en-US" sz="1200" dirty="0"/>
+              <a:t>Then the </a:t>
+            </a:r>
+            <a:r>
+              <a:rPr lang="en-US" sz="1200" dirty="0">
+                <a:solidFill>
+                  <a:schemeClr val="accent2"/>
+                </a:solidFill>
+              </a:rPr>
+              <a:t>prominence</a:t>
+            </a:r>
+            <a:r>
+              <a:rPr lang="en-US" sz="1200" dirty="0"/>
+              <a:t> is evaluated as </a:t>
+            </a:r>
+            <a:r>
+              <a:rPr lang="en-US" sz="1200" dirty="0" err="1"/>
+              <a:t>mult_factor</a:t>
+            </a:r>
+            <a:r>
+              <a:rPr lang="en-US" sz="1200" dirty="0"/>
+              <a:t> times (5) the SD of the segment (plot on the right: tuning of </a:t>
+            </a:r>
+            <a:r>
+              <a:rPr lang="en-US" sz="1200" dirty="0" err="1"/>
+              <a:t>mult_factor</a:t>
+            </a:r>
+            <a:r>
+              <a:rPr lang="en-US" sz="1200" dirty="0"/>
+              <a:t> on the training set)</a:t>
+            </a:r>
+          </a:p>
+          <a:p>
+            <a:pPr marL="800100" lvl="1" indent="-342900">
+              <a:buFont typeface="+mj-lt"/>
+              <a:buAutoNum type="arabicPeriod"/>
+            </a:pPr>
+            <a:r>
+              <a:rPr lang="en-US" sz="1050" dirty="0"/>
+              <a:t>E.g., </a:t>
+            </a:r>
+            <a:r>
+              <a:rPr lang="en-US" sz="1050" dirty="0" err="1">
+                <a:solidFill>
+                  <a:schemeClr val="accent2"/>
+                </a:solidFill>
+              </a:rPr>
+              <a:t>prominence_value</a:t>
+            </a:r>
+            <a:r>
+              <a:rPr lang="en-US" sz="1050" dirty="0"/>
+              <a:t>=</a:t>
+            </a:r>
+            <a:r>
+              <a:rPr lang="en-US" sz="1050" dirty="0" err="1"/>
+              <a:t>mult_factor</a:t>
+            </a:r>
+            <a:r>
+              <a:rPr lang="en-US" sz="1050" dirty="0"/>
+              <a:t>*</a:t>
+            </a:r>
+            <a:r>
+              <a:rPr lang="en-US" sz="1050" dirty="0" err="1"/>
+              <a:t>sd</a:t>
+            </a:r>
+            <a:r>
+              <a:rPr lang="en-US" sz="1050" dirty="0"/>
+              <a:t>(</a:t>
+            </a:r>
+            <a:r>
+              <a:rPr lang="en-US" sz="1050" dirty="0" err="1"/>
+              <a:t>atrial_phase</a:t>
+            </a:r>
+            <a:r>
+              <a:rPr lang="en-US" sz="1050" dirty="0"/>
+              <a:t>)</a:t>
+            </a:r>
+          </a:p>
+          <a:p>
+            <a:pPr marL="800100" lvl="1" indent="-342900">
+              <a:buFont typeface="+mj-lt"/>
+              <a:buAutoNum type="arabicPeriod"/>
+            </a:pPr>
+            <a:endParaRPr lang="en-US" sz="1050" dirty="0"/>
+          </a:p>
+          <a:p>
+            <a:pPr marL="342900" indent="-342900">
+              <a:buFont typeface="+mj-lt"/>
+              <a:buAutoNum type="arabicPeriod"/>
+            </a:pPr>
+            <a:r>
+              <a:rPr lang="en-US" sz="1200" dirty="0"/>
+              <a:t>Function</a:t>
+            </a:r>
+            <a:r>
+              <a:rPr lang="en-US" sz="1200" i="1" dirty="0">
+                <a:solidFill>
+                  <a:srgbClr val="0070C0"/>
+                </a:solidFill>
+              </a:rPr>
+              <a:t> </a:t>
+            </a:r>
+            <a:r>
+              <a:rPr lang="en-US" sz="1200" i="1" dirty="0" err="1">
+                <a:solidFill>
+                  <a:srgbClr val="0070C0"/>
+                </a:solidFill>
+              </a:rPr>
+              <a:t>find_peaks</a:t>
+            </a:r>
+            <a:r>
+              <a:rPr lang="en-US" sz="1200" i="1" dirty="0">
+                <a:solidFill>
+                  <a:srgbClr val="0070C0"/>
+                </a:solidFill>
+              </a:rPr>
+              <a:t> </a:t>
+            </a:r>
+            <a:r>
+              <a:rPr lang="en-US" sz="1200" dirty="0"/>
+              <a:t>is used to find peaks inside each segment. If multiple peaks are found, the highest one is chosen:</a:t>
+            </a:r>
+          </a:p>
+          <a:p>
+            <a:pPr marL="800100" lvl="1" indent="-342900">
+              <a:buFont typeface="+mj-lt"/>
+              <a:buAutoNum type="arabicPeriod"/>
+            </a:pPr>
+            <a:r>
+              <a:rPr lang="en-US" sz="1050" dirty="0"/>
+              <a:t>E.g., </a:t>
+            </a:r>
+            <a:r>
+              <a:rPr lang="en-US" sz="1050" dirty="0" err="1"/>
+              <a:t>atrial_peaks</a:t>
+            </a:r>
+            <a:r>
+              <a:rPr lang="en-US" sz="1050" dirty="0"/>
+              <a:t>=</a:t>
+            </a:r>
+            <a:r>
+              <a:rPr lang="en-US" sz="1050" dirty="0" err="1">
+                <a:solidFill>
+                  <a:srgbClr val="0070C0"/>
+                </a:solidFill>
+              </a:rPr>
+              <a:t>find_peaks</a:t>
+            </a:r>
+            <a:r>
+              <a:rPr lang="en-US" sz="1050" dirty="0"/>
+              <a:t>(</a:t>
+            </a:r>
+            <a:r>
+              <a:rPr lang="en-US" sz="1050" dirty="0" err="1"/>
+              <a:t>atrial_phase</a:t>
+            </a:r>
+            <a:r>
+              <a:rPr lang="en-US" sz="1050" dirty="0"/>
+              <a:t>, </a:t>
+            </a:r>
+            <a:r>
+              <a:rPr lang="en-US" sz="1050" dirty="0" err="1">
+                <a:solidFill>
+                  <a:schemeClr val="accent2"/>
+                </a:solidFill>
+              </a:rPr>
+              <a:t>prominence_value</a:t>
+            </a:r>
+            <a:r>
+              <a:rPr lang="en-US" sz="1050" dirty="0"/>
+              <a:t>)</a:t>
+            </a:r>
+          </a:p>
+          <a:p>
+            <a:pPr marL="800100" lvl="1" indent="-342900">
+              <a:buFont typeface="+mj-lt"/>
+              <a:buAutoNum type="arabicPeriod"/>
+            </a:pPr>
+            <a:r>
+              <a:rPr lang="en-US" sz="1050" dirty="0"/>
+              <a:t>If the list of peaks is empty, the peak value is set to </a:t>
+            </a:r>
+            <a:r>
+              <a:rPr lang="en-US" sz="1050" dirty="0" err="1">
+                <a:solidFill>
+                  <a:srgbClr val="7030A0"/>
+                </a:solidFill>
+              </a:rPr>
+              <a:t>NaN</a:t>
+            </a:r>
+            <a:endParaRPr lang="en-US" sz="1050" dirty="0">
+              <a:solidFill>
+                <a:srgbClr val="7030A0"/>
+              </a:solidFill>
+            </a:endParaRPr>
+          </a:p>
+          <a:p>
+            <a:pPr marL="800100" lvl="1" indent="-342900">
+              <a:buFont typeface="+mj-lt"/>
+              <a:buAutoNum type="arabicPeriod"/>
+            </a:pPr>
+            <a:endParaRPr lang="en-US" sz="1050" dirty="0"/>
+          </a:p>
+          <a:p>
+            <a:pPr marL="342900" indent="-342900">
+              <a:buFont typeface="+mj-lt"/>
+              <a:buAutoNum type="arabicPeriod"/>
+            </a:pPr>
+            <a:r>
+              <a:rPr lang="en-US" sz="1200" dirty="0"/>
+              <a:t>Finally, the three peaks are compared:</a:t>
+            </a:r>
+          </a:p>
+          <a:p>
+            <a:pPr marL="800100" lvl="1" indent="-342900">
+              <a:buFont typeface="+mj-lt"/>
+              <a:buAutoNum type="arabicPeriod"/>
+            </a:pPr>
+            <a:r>
+              <a:rPr lang="en-US" sz="1050" dirty="0">
+                <a:solidFill>
+                  <a:srgbClr val="7030A0"/>
+                </a:solidFill>
+              </a:rPr>
+              <a:t>If</a:t>
+            </a:r>
+            <a:r>
+              <a:rPr lang="en-US" sz="1050" dirty="0"/>
+              <a:t> not(</a:t>
+            </a:r>
+            <a:r>
+              <a:rPr lang="en-US" sz="1050" dirty="0" err="1">
+                <a:solidFill>
+                  <a:srgbClr val="7030A0"/>
+                </a:solidFill>
+              </a:rPr>
+              <a:t>isnan</a:t>
+            </a:r>
+            <a:r>
+              <a:rPr lang="en-US" sz="1050" dirty="0"/>
+              <a:t>(</a:t>
+            </a:r>
+            <a:r>
+              <a:rPr lang="en-US" sz="1050" dirty="0" err="1"/>
+              <a:t>his_peak</a:t>
+            </a:r>
+            <a:r>
+              <a:rPr lang="en-US" sz="1050" dirty="0"/>
+              <a:t>)) </a:t>
+            </a:r>
+            <a:r>
+              <a:rPr lang="en-US" sz="1050" dirty="0">
+                <a:sym typeface="Wingdings" panose="05000000000000000000" pitchFamily="2" charset="2"/>
+              </a:rPr>
+              <a:t> </a:t>
+            </a:r>
+            <a:r>
+              <a:rPr lang="en-US" sz="1050" dirty="0">
+                <a:solidFill>
+                  <a:schemeClr val="accent1"/>
+                </a:solidFill>
+                <a:sym typeface="Wingdings" panose="05000000000000000000" pitchFamily="2" charset="2"/>
+              </a:rPr>
+              <a:t>MAP_C</a:t>
+            </a:r>
+          </a:p>
+          <a:p>
+            <a:pPr marL="800100" lvl="1" indent="-342900">
+              <a:buFont typeface="+mj-lt"/>
+              <a:buAutoNum type="arabicPeriod"/>
+            </a:pPr>
+            <a:r>
+              <a:rPr lang="en-US" sz="1050" dirty="0" err="1">
+                <a:solidFill>
+                  <a:srgbClr val="7030A0"/>
+                </a:solidFill>
+                <a:sym typeface="Wingdings" panose="05000000000000000000" pitchFamily="2" charset="2"/>
+              </a:rPr>
+              <a:t>Elif</a:t>
+            </a:r>
+            <a:r>
+              <a:rPr lang="en-US" sz="1050" dirty="0">
+                <a:solidFill>
+                  <a:srgbClr val="7030A0"/>
+                </a:solidFill>
+                <a:sym typeface="Wingdings" panose="05000000000000000000" pitchFamily="2" charset="2"/>
+              </a:rPr>
+              <a:t> </a:t>
+            </a:r>
+            <a:r>
+              <a:rPr lang="en-US" sz="1050" dirty="0">
+                <a:sym typeface="Wingdings" panose="05000000000000000000" pitchFamily="2" charset="2"/>
+              </a:rPr>
+              <a:t>[</a:t>
+            </a:r>
+            <a:r>
+              <a:rPr lang="en-US" sz="1050" dirty="0" err="1">
+                <a:sym typeface="Wingdings" panose="05000000000000000000" pitchFamily="2" charset="2"/>
+              </a:rPr>
+              <a:t>atrial_peak</a:t>
+            </a:r>
+            <a:r>
+              <a:rPr lang="en-US" sz="1050" dirty="0">
+                <a:sym typeface="Wingdings" panose="05000000000000000000" pitchFamily="2" charset="2"/>
+              </a:rPr>
+              <a:t>&gt;</a:t>
+            </a:r>
+            <a:r>
+              <a:rPr lang="en-US" sz="1050" dirty="0" err="1">
+                <a:sym typeface="Wingdings" panose="05000000000000000000" pitchFamily="2" charset="2"/>
+              </a:rPr>
+              <a:t>vent_peak</a:t>
+            </a:r>
+            <a:r>
+              <a:rPr lang="en-US" sz="1050" dirty="0">
+                <a:sym typeface="Wingdings" panose="05000000000000000000" pitchFamily="2" charset="2"/>
+              </a:rPr>
+              <a:t> </a:t>
+            </a:r>
+            <a:r>
+              <a:rPr lang="en-US" sz="1050" dirty="0">
+                <a:solidFill>
+                  <a:srgbClr val="7030A0"/>
+                </a:solidFill>
+                <a:sym typeface="Wingdings" panose="05000000000000000000" pitchFamily="2" charset="2"/>
+              </a:rPr>
+              <a:t>OR</a:t>
+            </a:r>
+            <a:r>
+              <a:rPr lang="en-US" sz="1050" dirty="0">
+                <a:sym typeface="Wingdings" panose="05000000000000000000" pitchFamily="2" charset="2"/>
+              </a:rPr>
+              <a:t> </a:t>
+            </a:r>
+            <a:r>
+              <a:rPr lang="en-US" sz="1050" dirty="0" err="1">
+                <a:solidFill>
+                  <a:srgbClr val="7030A0"/>
+                </a:solidFill>
+                <a:sym typeface="Wingdings" panose="05000000000000000000" pitchFamily="2" charset="2"/>
+              </a:rPr>
+              <a:t>isnan</a:t>
+            </a:r>
+            <a:r>
+              <a:rPr lang="en-US" sz="1050" dirty="0">
+                <a:sym typeface="Wingdings" panose="05000000000000000000" pitchFamily="2" charset="2"/>
+              </a:rPr>
+              <a:t>(</a:t>
+            </a:r>
+            <a:r>
+              <a:rPr lang="en-US" sz="1050" dirty="0" err="1">
+                <a:sym typeface="Wingdings" panose="05000000000000000000" pitchFamily="2" charset="2"/>
+              </a:rPr>
+              <a:t>vent_peak</a:t>
+            </a:r>
+            <a:r>
+              <a:rPr lang="en-US" sz="1050" dirty="0">
+                <a:sym typeface="Wingdings" panose="05000000000000000000" pitchFamily="2" charset="2"/>
+              </a:rPr>
+              <a:t>)]  </a:t>
+            </a:r>
+            <a:r>
+              <a:rPr lang="en-US" sz="1050" dirty="0">
+                <a:solidFill>
+                  <a:srgbClr val="0070C0"/>
+                </a:solidFill>
+                <a:sym typeface="Wingdings" panose="05000000000000000000" pitchFamily="2" charset="2"/>
+              </a:rPr>
+              <a:t>MAP_A</a:t>
+            </a:r>
+          </a:p>
+          <a:p>
+            <a:pPr marL="800100" lvl="1" indent="-342900">
+              <a:buFont typeface="+mj-lt"/>
+              <a:buAutoNum type="arabicPeriod"/>
+            </a:pPr>
+            <a:r>
+              <a:rPr lang="en-US" sz="1050" dirty="0">
+                <a:solidFill>
+                  <a:srgbClr val="7030A0"/>
+                </a:solidFill>
+                <a:sym typeface="Wingdings" panose="05000000000000000000" pitchFamily="2" charset="2"/>
+              </a:rPr>
+              <a:t>Else </a:t>
+            </a:r>
+            <a:r>
+              <a:rPr lang="en-US" sz="1050" dirty="0">
+                <a:sym typeface="Wingdings" panose="05000000000000000000" pitchFamily="2" charset="2"/>
+              </a:rPr>
+              <a:t> </a:t>
+            </a:r>
+            <a:r>
+              <a:rPr lang="en-US" sz="1050" dirty="0">
+                <a:solidFill>
+                  <a:srgbClr val="00B050"/>
+                </a:solidFill>
+                <a:sym typeface="Wingdings" panose="05000000000000000000" pitchFamily="2" charset="2"/>
+              </a:rPr>
+              <a:t>MAP_B</a:t>
+            </a:r>
+            <a:endParaRPr lang="en-US" sz="1050" dirty="0">
+              <a:solidFill>
+                <a:srgbClr val="00B050"/>
+              </a:solidFill>
+            </a:endParaRPr>
+          </a:p>
+        </p:txBody>
+      </p:sp>
+      <p:pic>
+        <p:nvPicPr>
+          <p:cNvPr id="21" name="Immagine 20">
+            <a:extLst>
+              <a:ext uri="{FF2B5EF4-FFF2-40B4-BE49-F238E27FC236}">
+                <a16:creationId xmlns:a16="http://schemas.microsoft.com/office/drawing/2014/main" id="{4DAE0984-AE0E-18BA-0304-968AD6707320}"/>
+              </a:ext>
+            </a:extLst>
+          </p:cNvPr>
+          <p:cNvPicPr>
+            <a:picLocks noChangeAspect="1"/>
+          </p:cNvPicPr>
+          <p:nvPr/>
+        </p:nvPicPr>
+        <p:blipFill>
+          <a:blip r:embed="rId4"/>
+          <a:stretch>
+            <a:fillRect/>
+          </a:stretch>
+        </p:blipFill>
+        <p:spPr>
+          <a:xfrm>
+            <a:off x="118872" y="1812745"/>
+            <a:ext cx="2790390" cy="4496414"/>
+          </a:xfrm>
+          <a:prstGeom prst="rect">
+            <a:avLst/>
+          </a:prstGeom>
+        </p:spPr>
+      </p:pic>
+      <p:pic>
+        <p:nvPicPr>
+          <p:cNvPr id="22" name="Immagine 21" descr="Immagine che contiene testo, diagramma, linea, Diagramma&#10;&#10;Descrizione generata automaticamente">
+            <a:extLst>
+              <a:ext uri="{FF2B5EF4-FFF2-40B4-BE49-F238E27FC236}">
+                <a16:creationId xmlns:a16="http://schemas.microsoft.com/office/drawing/2014/main" id="{ECFCD019-F578-3BB9-E056-863FBF50733E}"/>
+              </a:ext>
+            </a:extLst>
+          </p:cNvPr>
+          <p:cNvPicPr>
+            <a:picLocks noChangeAspect="1"/>
+          </p:cNvPicPr>
+          <p:nvPr/>
+        </p:nvPicPr>
+        <p:blipFill>
+          <a:blip r:embed="rId5">
+            <a:extLst>
+              <a:ext uri="{28A0092B-C50C-407E-A947-70E740481C1C}">
+                <a14:useLocalDpi xmlns:a14="http://schemas.microsoft.com/office/drawing/2010/main" val="0"/>
+              </a:ext>
+            </a:extLst>
+          </a:blip>
+          <a:stretch>
+            <a:fillRect/>
+          </a:stretch>
+        </p:blipFill>
+        <p:spPr>
+          <a:xfrm>
+            <a:off x="8161230" y="1534702"/>
+            <a:ext cx="3856431" cy="2570954"/>
+          </a:xfrm>
+          <a:prstGeom prst="rect">
+            <a:avLst/>
+          </a:prstGeom>
+        </p:spPr>
+      </p:pic>
+      <p:cxnSp>
+        <p:nvCxnSpPr>
+          <p:cNvPr id="24" name="Connettore diritto 23">
+            <a:extLst>
+              <a:ext uri="{FF2B5EF4-FFF2-40B4-BE49-F238E27FC236}">
+                <a16:creationId xmlns:a16="http://schemas.microsoft.com/office/drawing/2014/main" id="{C1F6FDCB-056F-2FA1-4B99-55F5DD555E54}"/>
+              </a:ext>
+            </a:extLst>
+          </p:cNvPr>
+          <p:cNvCxnSpPr/>
+          <p:nvPr/>
+        </p:nvCxnSpPr>
+        <p:spPr>
+          <a:xfrm flipV="1">
+            <a:off x="9616440" y="1891632"/>
+            <a:ext cx="0" cy="1931269"/>
+          </a:xfrm>
+          <a:prstGeom prst="line">
+            <a:avLst/>
+          </a:prstGeom>
+          <a:ln w="19050" cap="flat" cmpd="sng" algn="ctr">
+            <a:solidFill>
+              <a:schemeClr val="dk1"/>
+            </a:solidFill>
+            <a:prstDash val="dash"/>
+            <a:round/>
+            <a:headEnd type="none" w="med" len="med"/>
+            <a:tailEnd type="none" w="med" len="med"/>
+          </a:ln>
+        </p:spPr>
+        <p:style>
+          <a:lnRef idx="0">
+            <a:scrgbClr r="0" g="0" b="0"/>
+          </a:lnRef>
+          <a:fillRef idx="0">
+            <a:scrgbClr r="0" g="0" b="0"/>
+          </a:fillRef>
+          <a:effectRef idx="0">
+            <a:scrgbClr r="0" g="0" b="0"/>
+          </a:effectRef>
+          <a:fontRef idx="minor">
+            <a:schemeClr val="tx1"/>
+          </a:fontRef>
+        </p:style>
+      </p:cxnSp>
+    </p:spTree>
+    <p:extLst>
+      <p:ext uri="{BB962C8B-B14F-4D97-AF65-F5344CB8AC3E}">
+        <p14:creationId xmlns:p14="http://schemas.microsoft.com/office/powerpoint/2010/main" val="3415613353"/>
+      </p:ext>
+    </p:extLst>
+  </p:cSld>
+  <p:clrMapOvr>
+    <a:masterClrMapping/>
+  </p:clrMapOvr>
+</p:sld>
+</file>
+
+<file path=ppt/slides/slide15.xml><?xml version="1.0" encoding="utf-8"?>
+<p:sld xmlns:a="http://schemas.openxmlformats.org/drawingml/2006/main" xmlns:r="http://schemas.openxmlformats.org/officeDocument/2006/relationships" xmlns:p="http://schemas.openxmlformats.org/presentationml/2006/main">
+  <p:cSld>
+    <p:spTree>
+      <p:nvGrpSpPr>
+        <p:cNvPr id="1" name="">
+          <a:extLst>
+            <a:ext uri="{FF2B5EF4-FFF2-40B4-BE49-F238E27FC236}">
               <a16:creationId xmlns:a16="http://schemas.microsoft.com/office/drawing/2014/main" id="{308903F5-76B3-3691-6161-D7CE94B28A6A}"/>
             </a:ext>
           </a:extLst>
@@ -9689,7 +10796,7 @@
           <a:p>
             <a:fld id="{2FA0223F-D95A-431D-9A71-EDA7FA0C2F5B}" type="slidenum">
               <a:rPr lang="en-US" smtClean="0"/>
-              <a:t>14</a:t>
+              <a:t>15</a:t>
             </a:fld>
             <a:endParaRPr lang="en-US" dirty="0"/>
           </a:p>
@@ -9708,7 +10815,7 @@
 </p:sld>
 </file>
 
-<file path=ppt/slides/slide15.xml><?xml version="1.0" encoding="utf-8"?>
+<file path=ppt/slides/slide16.xml><?xml version="1.0" encoding="utf-8"?>
 <p:sld xmlns:a="http://schemas.openxmlformats.org/drawingml/2006/main" xmlns:r="http://schemas.openxmlformats.org/officeDocument/2006/relationships" xmlns:p="http://schemas.openxmlformats.org/presentationml/2006/main">
   <p:cSld>
     <p:spTree>
@@ -9789,7 +10896,7 @@
           <a:p>
             <a:fld id="{2FA0223F-D95A-431D-9A71-EDA7FA0C2F5B}" type="slidenum">
               <a:rPr lang="en-US" smtClean="0"/>
-              <a:t>15</a:t>
+              <a:t>16</a:t>
             </a:fld>
             <a:endParaRPr lang="en-US"/>
           </a:p>
@@ -10027,10 +11134,10 @@
       </p:sp>
       <p:pic>
         <p:nvPicPr>
-          <p:cNvPr id="5" name="Immagine 4" descr="Immagine che contiene testo, schermata, linea, Diagramma&#10;&#10;Descrizione generata automaticamente">
-            <a:extLst>
-              <a:ext uri="{FF2B5EF4-FFF2-40B4-BE49-F238E27FC236}">
-                <a16:creationId xmlns:a16="http://schemas.microsoft.com/office/drawing/2014/main" id="{D511BEDE-337F-55D2-2778-FA142F4B4A98}"/>
+          <p:cNvPr id="10" name="Immagine 9">
+            <a:extLst>
+              <a:ext uri="{FF2B5EF4-FFF2-40B4-BE49-F238E27FC236}">
+                <a16:creationId xmlns:a16="http://schemas.microsoft.com/office/drawing/2014/main" id="{93BCDDF5-0249-F9FF-E65F-A6A353EFB0F6}"/>
               </a:ext>
             </a:extLst>
           </p:cNvPr>
@@ -10053,8 +11160,8 @@
         </p:blipFill>
         <p:spPr>
           <a:xfrm>
-            <a:off x="4830874" y="1615302"/>
-            <a:ext cx="6522926" cy="4348617"/>
+            <a:off x="5537200" y="1615302"/>
+            <a:ext cx="6045482" cy="4030321"/>
           </a:xfrm>
           <a:prstGeom prst="rect">
             <a:avLst/>
@@ -10074,7 +11181,7 @@
 </p:sld>
 </file>
 
-<file path=ppt/slides/slide16.xml><?xml version="1.0" encoding="utf-8"?>
+<file path=ppt/slides/slide17.xml><?xml version="1.0" encoding="utf-8"?>
 <p:sld xmlns:a="http://schemas.openxmlformats.org/drawingml/2006/main" xmlns:r="http://schemas.openxmlformats.org/officeDocument/2006/relationships" xmlns:p="http://schemas.openxmlformats.org/presentationml/2006/main">
   <p:cSld>
     <p:spTree>
@@ -10155,7 +11262,7 @@
           <a:p>
             <a:fld id="{2FA0223F-D95A-431D-9A71-EDA7FA0C2F5B}" type="slidenum">
               <a:rPr lang="en-US" smtClean="0"/>
-              <a:t>16</a:t>
+              <a:t>17</a:t>
             </a:fld>
             <a:endParaRPr lang="en-US"/>
           </a:p>
@@ -10373,38 +11480,16 @@
             </a:r>
           </a:p>
           <a:p>
-            <a:r>
-              <a:rPr lang="en-US" sz="1600" dirty="0"/>
-              <a:t>It should be noted that this signal has the atrial peak </a:t>
-            </a:r>
-            <a:r>
-              <a:rPr lang="en-US" sz="1600" i="1" dirty="0"/>
-              <a:t>after 0.35.</a:t>
-            </a:r>
-            <a:r>
-              <a:rPr lang="en-US" sz="1600" dirty="0"/>
-              <a:t> Probably this is a fortuitous case.</a:t>
-            </a:r>
-            <a:endParaRPr lang="en-US" sz="1600" dirty="0">
-              <a:solidFill>
-                <a:schemeClr val="tx2">
-                  <a:lumMod val="60000"/>
-                  <a:lumOff val="40000"/>
-                </a:schemeClr>
-              </a:solidFill>
-            </a:endParaRPr>
-          </a:p>
-          <a:p>
             <a:endParaRPr lang="en-US" sz="1600" dirty="0"/>
           </a:p>
         </p:txBody>
       </p:sp>
       <p:pic>
         <p:nvPicPr>
-          <p:cNvPr id="6" name="Immagine 5" descr="Immagine che contiene testo, schermata, linea, Diagramma&#10;&#10;Descrizione generata automaticamente">
-            <a:extLst>
-              <a:ext uri="{FF2B5EF4-FFF2-40B4-BE49-F238E27FC236}">
-                <a16:creationId xmlns:a16="http://schemas.microsoft.com/office/drawing/2014/main" id="{038880C0-4F0E-799F-BAB3-23F1265E4DB0}"/>
+          <p:cNvPr id="8" name="Immagine 7" descr="Immagine che contiene testo, linea, schermata, Diagramma&#10;&#10;Descrizione generata automaticamente">
+            <a:extLst>
+              <a:ext uri="{FF2B5EF4-FFF2-40B4-BE49-F238E27FC236}">
+                <a16:creationId xmlns:a16="http://schemas.microsoft.com/office/drawing/2014/main" id="{810E1CFF-CAAC-EE21-4DB0-4A585EF887DD}"/>
               </a:ext>
             </a:extLst>
           </p:cNvPr>
@@ -10427,8 +11512,8 @@
         </p:blipFill>
         <p:spPr>
           <a:xfrm>
-            <a:off x="5105195" y="1615303"/>
-            <a:ext cx="6248606" cy="4165737"/>
+            <a:off x="5433136" y="1615302"/>
+            <a:ext cx="6149546" cy="4099697"/>
           </a:xfrm>
           <a:prstGeom prst="rect">
             <a:avLst/>
@@ -10448,7 +11533,7 @@
 </p:sld>
 </file>
 
-<file path=ppt/slides/slide17.xml><?xml version="1.0" encoding="utf-8"?>
+<file path=ppt/slides/slide18.xml><?xml version="1.0" encoding="utf-8"?>
 <p:sld xmlns:a="http://schemas.openxmlformats.org/drawingml/2006/main" xmlns:r="http://schemas.openxmlformats.org/officeDocument/2006/relationships" xmlns:p="http://schemas.openxmlformats.org/presentationml/2006/main">
   <p:cSld>
     <p:spTree>
@@ -10529,7 +11614,7 @@
           <a:p>
             <a:fld id="{2FA0223F-D95A-431D-9A71-EDA7FA0C2F5B}" type="slidenum">
               <a:rPr lang="en-US" smtClean="0"/>
-              <a:t>17</a:t>
+              <a:t>18</a:t>
             </a:fld>
             <a:endParaRPr lang="en-US"/>
           </a:p>
@@ -10770,10 +11855,10 @@
       </p:sp>
       <p:pic>
         <p:nvPicPr>
-          <p:cNvPr id="6" name="Immagine 5" descr="Immagine che contiene testo, linea, diagramma, Diagramma&#10;&#10;Descrizione generata automaticamente">
-            <a:extLst>
-              <a:ext uri="{FF2B5EF4-FFF2-40B4-BE49-F238E27FC236}">
-                <a16:creationId xmlns:a16="http://schemas.microsoft.com/office/drawing/2014/main" id="{7E5DCCF8-E74D-CC53-978B-8412BFCD4DF9}"/>
+          <p:cNvPr id="5" name="Immagine 4" descr="Immagine che contiene testo, linea, schermata, Diagramma&#10;&#10;Descrizione generata automaticamente">
+            <a:extLst>
+              <a:ext uri="{FF2B5EF4-FFF2-40B4-BE49-F238E27FC236}">
+                <a16:creationId xmlns:a16="http://schemas.microsoft.com/office/drawing/2014/main" id="{2BAF94B2-4583-5820-EC9A-0578D66B48D9}"/>
               </a:ext>
             </a:extLst>
           </p:cNvPr>
@@ -10796,8 +11881,8 @@
         </p:blipFill>
         <p:spPr>
           <a:xfrm>
-            <a:off x="5059680" y="1615302"/>
-            <a:ext cx="6294261" cy="4196174"/>
+            <a:off x="5541263" y="1615303"/>
+            <a:ext cx="6242445" cy="4161630"/>
           </a:xfrm>
           <a:prstGeom prst="rect">
             <a:avLst/>
@@ -10817,7 +11902,7 @@
 </p:sld>
 </file>
 
-<file path=ppt/slides/slide18.xml><?xml version="1.0" encoding="utf-8"?>
+<file path=ppt/slides/slide19.xml><?xml version="1.0" encoding="utf-8"?>
 <p:sld xmlns:a="http://schemas.openxmlformats.org/drawingml/2006/main" xmlns:r="http://schemas.openxmlformats.org/officeDocument/2006/relationships" xmlns:p="http://schemas.openxmlformats.org/presentationml/2006/main">
   <p:cSld>
     <p:spTree>
@@ -10898,7 +11983,7 @@
           <a:p>
             <a:fld id="{2FA0223F-D95A-431D-9A71-EDA7FA0C2F5B}" type="slidenum">
               <a:rPr lang="en-US" smtClean="0"/>
-              <a:t>18</a:t>
+              <a:t>19</a:t>
             </a:fld>
             <a:endParaRPr lang="en-US"/>
           </a:p>
@@ -11136,10 +12221,10 @@
       </p:sp>
       <p:pic>
         <p:nvPicPr>
-          <p:cNvPr id="17" name="Immagine 16" descr="Immagine che contiene testo, linea, Diagramma, schermata&#10;&#10;Descrizione generata automaticamente">
-            <a:extLst>
-              <a:ext uri="{FF2B5EF4-FFF2-40B4-BE49-F238E27FC236}">
-                <a16:creationId xmlns:a16="http://schemas.microsoft.com/office/drawing/2014/main" id="{DF208CF5-C6D9-FA73-AA15-8D871D005C92}"/>
+          <p:cNvPr id="5" name="Immagine 4" descr="Immagine che contiene testo, linea, diagramma, Diagramma&#10;&#10;Descrizione generata automaticamente">
+            <a:extLst>
+              <a:ext uri="{FF2B5EF4-FFF2-40B4-BE49-F238E27FC236}">
+                <a16:creationId xmlns:a16="http://schemas.microsoft.com/office/drawing/2014/main" id="{18CB5C79-D145-14EE-2887-1C1A27D274D9}"/>
               </a:ext>
             </a:extLst>
           </p:cNvPr>
@@ -11162,8 +12247,8 @@
         </p:blipFill>
         <p:spPr>
           <a:xfrm>
-            <a:off x="4724400" y="1608802"/>
-            <a:ext cx="6543181" cy="4362121"/>
+            <a:off x="5110480" y="1615302"/>
+            <a:ext cx="6167132" cy="4111421"/>
           </a:xfrm>
           <a:prstGeom prst="rect">
             <a:avLst/>
@@ -11183,7 +12268,160 @@
 </p:sld>
 </file>
 
-<file path=ppt/slides/slide19.xml><?xml version="1.0" encoding="utf-8"?>
+<file path=ppt/slides/slide2.xml><?xml version="1.0" encoding="utf-8"?>
+<p:sld xmlns:a="http://schemas.openxmlformats.org/drawingml/2006/main" xmlns:r="http://schemas.openxmlformats.org/officeDocument/2006/relationships" xmlns:p="http://schemas.openxmlformats.org/presentationml/2006/main">
+  <p:cSld>
+    <p:spTree>
+      <p:nvGrpSpPr>
+        <p:cNvPr id="1" name=""/>
+        <p:cNvGrpSpPr/>
+        <p:nvPr/>
+      </p:nvGrpSpPr>
+      <p:grpSpPr>
+        <a:xfrm>
+          <a:off x="0" y="0"/>
+          <a:ext cx="0" cy="0"/>
+          <a:chOff x="0" y="0"/>
+          <a:chExt cx="0" cy="0"/>
+        </a:xfrm>
+      </p:grpSpPr>
+      <p:sp>
+        <p:nvSpPr>
+          <p:cNvPr id="2" name="Titolo 1">
+            <a:extLst>
+              <a:ext uri="{FF2B5EF4-FFF2-40B4-BE49-F238E27FC236}">
+                <a16:creationId xmlns:a16="http://schemas.microsoft.com/office/drawing/2014/main" id="{90F52EA4-9809-985C-8A8C-85AEDD39AF3B}"/>
+              </a:ext>
+            </a:extLst>
+          </p:cNvPr>
+          <p:cNvSpPr>
+            <a:spLocks noGrp="1"/>
+          </p:cNvSpPr>
+          <p:nvPr>
+            <p:ph type="title"/>
+          </p:nvPr>
+        </p:nvSpPr>
+        <p:spPr/>
+        <p:txBody>
+          <a:bodyPr/>
+          <a:lstStyle/>
+          <a:p>
+            <a:r>
+              <a:rPr lang="en-US" dirty="0"/>
+              <a:t>Outline </a:t>
+            </a:r>
+          </a:p>
+        </p:txBody>
+      </p:sp>
+      <p:sp>
+        <p:nvSpPr>
+          <p:cNvPr id="3" name="Segnaposto contenuto 2">
+            <a:extLst>
+              <a:ext uri="{FF2B5EF4-FFF2-40B4-BE49-F238E27FC236}">
+                <a16:creationId xmlns:a16="http://schemas.microsoft.com/office/drawing/2014/main" id="{B080D17D-5CB5-7A4C-86CF-032C6E6BEB1F}"/>
+              </a:ext>
+            </a:extLst>
+          </p:cNvPr>
+          <p:cNvSpPr>
+            <a:spLocks noGrp="1"/>
+          </p:cNvSpPr>
+          <p:nvPr>
+            <p:ph idx="1"/>
+          </p:nvPr>
+        </p:nvSpPr>
+        <p:spPr>
+          <a:xfrm>
+            <a:off x="664464" y="2041497"/>
+            <a:ext cx="10098024" cy="2613436"/>
+          </a:xfrm>
+        </p:spPr>
+        <p:txBody>
+          <a:bodyPr>
+            <a:noAutofit/>
+          </a:bodyPr>
+          <a:lstStyle/>
+          <a:p>
+            <a:r>
+              <a:rPr lang="en-US" sz="2000" dirty="0"/>
+              <a:t>Why building a heuristic classifier</a:t>
+            </a:r>
+          </a:p>
+          <a:p>
+            <a:r>
+              <a:rPr lang="en-US" sz="2000" dirty="0"/>
+              <a:t>Knowledge on roving signals: recap</a:t>
+            </a:r>
+          </a:p>
+          <a:p>
+            <a:r>
+              <a:rPr lang="en-US" sz="2000" dirty="0"/>
+              <a:t>Heuristic classifier: pseudo code</a:t>
+            </a:r>
+          </a:p>
+          <a:p>
+            <a:r>
+              <a:rPr lang="en-US" sz="2000" dirty="0"/>
+              <a:t>Performance</a:t>
+            </a:r>
+          </a:p>
+          <a:p>
+            <a:r>
+              <a:rPr lang="en-US" sz="2000" dirty="0"/>
+              <a:t>Conclusions </a:t>
+            </a:r>
+            <a:endParaRPr lang="en-US" sz="1600" dirty="0"/>
+          </a:p>
+          <a:p>
+            <a:pPr marL="0" indent="0">
+              <a:buNone/>
+            </a:pPr>
+            <a:endParaRPr lang="en-US" sz="1600" dirty="0"/>
+          </a:p>
+        </p:txBody>
+      </p:sp>
+      <p:sp>
+        <p:nvSpPr>
+          <p:cNvPr id="4" name="Segnaposto numero diapositiva 3">
+            <a:extLst>
+              <a:ext uri="{FF2B5EF4-FFF2-40B4-BE49-F238E27FC236}">
+                <a16:creationId xmlns:a16="http://schemas.microsoft.com/office/drawing/2014/main" id="{8B351BE6-1815-C162-224E-864AC8EF79D2}"/>
+              </a:ext>
+            </a:extLst>
+          </p:cNvPr>
+          <p:cNvSpPr>
+            <a:spLocks noGrp="1"/>
+          </p:cNvSpPr>
+          <p:nvPr>
+            <p:ph type="sldNum" sz="quarter" idx="12"/>
+          </p:nvPr>
+        </p:nvSpPr>
+        <p:spPr/>
+        <p:txBody>
+          <a:bodyPr/>
+          <a:lstStyle/>
+          <a:p>
+            <a:fld id="{2FA0223F-D95A-431D-9A71-EDA7FA0C2F5B}" type="slidenum">
+              <a:rPr lang="en-US" smtClean="0"/>
+              <a:t>2</a:t>
+            </a:fld>
+            <a:endParaRPr lang="en-US" dirty="0"/>
+          </a:p>
+        </p:txBody>
+      </p:sp>
+    </p:spTree>
+    <p:extLst>
+      <p:ext uri="{BB962C8B-B14F-4D97-AF65-F5344CB8AC3E}">
+        <p14:creationId xmlns:p14="http://schemas.microsoft.com/office/powerpoint/2010/main" val="1561499463"/>
+      </p:ext>
+    </p:extLst>
+  </p:cSld>
+  <p:clrMapOvr>
+    <a:masterClrMapping/>
+  </p:clrMapOvr>
+</p:sld>
+</file>
+
+<file path=ppt/slides/slide20.xml><?xml version="1.0" encoding="utf-8"?>
 <p:sld xmlns:a="http://schemas.openxmlformats.org/drawingml/2006/main" xmlns:r="http://schemas.openxmlformats.org/officeDocument/2006/relationships" xmlns:p="http://schemas.openxmlformats.org/presentationml/2006/main">
   <p:cSld>
     <p:spTree>
@@ -11264,7 +12502,7 @@
           <a:p>
             <a:fld id="{2FA0223F-D95A-431D-9A71-EDA7FA0C2F5B}" type="slidenum">
               <a:rPr lang="en-US" smtClean="0"/>
-              <a:t>19</a:t>
+              <a:t>20</a:t>
             </a:fld>
             <a:endParaRPr lang="en-US"/>
           </a:p>
@@ -11478,7 +12716,7 @@
           <a:p>
             <a:r>
               <a:rPr lang="en-US" sz="1600" dirty="0"/>
-              <a:t>Probably prominence values does not allow to distinguish the peak from noisy oscillations</a:t>
+              <a:t>The algorithm cannot recognize the His peak, which isn’t even clearly visible by visual inspection</a:t>
             </a:r>
           </a:p>
           <a:p>
@@ -11505,10 +12743,10 @@
       </p:sp>
       <p:pic>
         <p:nvPicPr>
-          <p:cNvPr id="5" name="Immagine 4" descr="Immagine che contiene testo, linea, Diagramma, diagramma&#10;&#10;Descrizione generata automaticamente">
-            <a:extLst>
-              <a:ext uri="{FF2B5EF4-FFF2-40B4-BE49-F238E27FC236}">
-                <a16:creationId xmlns:a16="http://schemas.microsoft.com/office/drawing/2014/main" id="{B74C8319-F5AB-3AAD-66ED-8D91D7935C6E}"/>
+          <p:cNvPr id="6" name="Immagine 5" descr="Immagine che contiene testo, linea, Diagramma, diagramma&#10;&#10;Descrizione generata automaticamente">
+            <a:extLst>
+              <a:ext uri="{FF2B5EF4-FFF2-40B4-BE49-F238E27FC236}">
+                <a16:creationId xmlns:a16="http://schemas.microsoft.com/office/drawing/2014/main" id="{EC9F7AB9-94CD-963D-DBB9-43C6DEE4ADB3}"/>
               </a:ext>
             </a:extLst>
           </p:cNvPr>
@@ -11531,8 +12769,8 @@
         </p:blipFill>
         <p:spPr>
           <a:xfrm>
-            <a:off x="4724400" y="1615303"/>
-            <a:ext cx="6515099" cy="4343399"/>
+            <a:off x="5090236" y="1615302"/>
+            <a:ext cx="6492446" cy="4328297"/>
           </a:xfrm>
           <a:prstGeom prst="rect">
             <a:avLst/>
@@ -11552,160 +12790,7 @@
 </p:sld>
 </file>
 
-<file path=ppt/slides/slide2.xml><?xml version="1.0" encoding="utf-8"?>
-<p:sld xmlns:a="http://schemas.openxmlformats.org/drawingml/2006/main" xmlns:r="http://schemas.openxmlformats.org/officeDocument/2006/relationships" xmlns:p="http://schemas.openxmlformats.org/presentationml/2006/main">
-  <p:cSld>
-    <p:spTree>
-      <p:nvGrpSpPr>
-        <p:cNvPr id="1" name=""/>
-        <p:cNvGrpSpPr/>
-        <p:nvPr/>
-      </p:nvGrpSpPr>
-      <p:grpSpPr>
-        <a:xfrm>
-          <a:off x="0" y="0"/>
-          <a:ext cx="0" cy="0"/>
-          <a:chOff x="0" y="0"/>
-          <a:chExt cx="0" cy="0"/>
-        </a:xfrm>
-      </p:grpSpPr>
-      <p:sp>
-        <p:nvSpPr>
-          <p:cNvPr id="2" name="Titolo 1">
-            <a:extLst>
-              <a:ext uri="{FF2B5EF4-FFF2-40B4-BE49-F238E27FC236}">
-                <a16:creationId xmlns:a16="http://schemas.microsoft.com/office/drawing/2014/main" id="{90F52EA4-9809-985C-8A8C-85AEDD39AF3B}"/>
-              </a:ext>
-            </a:extLst>
-          </p:cNvPr>
-          <p:cNvSpPr>
-            <a:spLocks noGrp="1"/>
-          </p:cNvSpPr>
-          <p:nvPr>
-            <p:ph type="title"/>
-          </p:nvPr>
-        </p:nvSpPr>
-        <p:spPr/>
-        <p:txBody>
-          <a:bodyPr/>
-          <a:lstStyle/>
-          <a:p>
-            <a:r>
-              <a:rPr lang="en-US" dirty="0"/>
-              <a:t>Outline </a:t>
-            </a:r>
-          </a:p>
-        </p:txBody>
-      </p:sp>
-      <p:sp>
-        <p:nvSpPr>
-          <p:cNvPr id="3" name="Segnaposto contenuto 2">
-            <a:extLst>
-              <a:ext uri="{FF2B5EF4-FFF2-40B4-BE49-F238E27FC236}">
-                <a16:creationId xmlns:a16="http://schemas.microsoft.com/office/drawing/2014/main" id="{B080D17D-5CB5-7A4C-86CF-032C6E6BEB1F}"/>
-              </a:ext>
-            </a:extLst>
-          </p:cNvPr>
-          <p:cNvSpPr>
-            <a:spLocks noGrp="1"/>
-          </p:cNvSpPr>
-          <p:nvPr>
-            <p:ph idx="1"/>
-          </p:nvPr>
-        </p:nvSpPr>
-        <p:spPr>
-          <a:xfrm>
-            <a:off x="664464" y="2041497"/>
-            <a:ext cx="10098024" cy="2613436"/>
-          </a:xfrm>
-        </p:spPr>
-        <p:txBody>
-          <a:bodyPr>
-            <a:noAutofit/>
-          </a:bodyPr>
-          <a:lstStyle/>
-          <a:p>
-            <a:r>
-              <a:rPr lang="en-US" sz="2000" dirty="0"/>
-              <a:t>Why building a heuristic classifier</a:t>
-            </a:r>
-          </a:p>
-          <a:p>
-            <a:r>
-              <a:rPr lang="en-US" sz="2000" dirty="0"/>
-              <a:t>Knowledge on roving signals: recap</a:t>
-            </a:r>
-          </a:p>
-          <a:p>
-            <a:r>
-              <a:rPr lang="en-US" sz="2000" dirty="0"/>
-              <a:t>Heuristic classifier: pseudo code</a:t>
-            </a:r>
-          </a:p>
-          <a:p>
-            <a:r>
-              <a:rPr lang="en-US" sz="2000" dirty="0"/>
-              <a:t>Performance</a:t>
-            </a:r>
-          </a:p>
-          <a:p>
-            <a:r>
-              <a:rPr lang="en-US" sz="2000" dirty="0"/>
-              <a:t>Conclusions </a:t>
-            </a:r>
-            <a:endParaRPr lang="en-US" sz="1600" dirty="0"/>
-          </a:p>
-          <a:p>
-            <a:pPr marL="0" indent="0">
-              <a:buNone/>
-            </a:pPr>
-            <a:endParaRPr lang="en-US" sz="1600" dirty="0"/>
-          </a:p>
-        </p:txBody>
-      </p:sp>
-      <p:sp>
-        <p:nvSpPr>
-          <p:cNvPr id="4" name="Segnaposto numero diapositiva 3">
-            <a:extLst>
-              <a:ext uri="{FF2B5EF4-FFF2-40B4-BE49-F238E27FC236}">
-                <a16:creationId xmlns:a16="http://schemas.microsoft.com/office/drawing/2014/main" id="{8B351BE6-1815-C162-224E-864AC8EF79D2}"/>
-              </a:ext>
-            </a:extLst>
-          </p:cNvPr>
-          <p:cNvSpPr>
-            <a:spLocks noGrp="1"/>
-          </p:cNvSpPr>
-          <p:nvPr>
-            <p:ph type="sldNum" sz="quarter" idx="12"/>
-          </p:nvPr>
-        </p:nvSpPr>
-        <p:spPr/>
-        <p:txBody>
-          <a:bodyPr/>
-          <a:lstStyle/>
-          <a:p>
-            <a:fld id="{2FA0223F-D95A-431D-9A71-EDA7FA0C2F5B}" type="slidenum">
-              <a:rPr lang="en-US" smtClean="0"/>
-              <a:t>2</a:t>
-            </a:fld>
-            <a:endParaRPr lang="en-US" dirty="0"/>
-          </a:p>
-        </p:txBody>
-      </p:sp>
-    </p:spTree>
-    <p:extLst>
-      <p:ext uri="{BB962C8B-B14F-4D97-AF65-F5344CB8AC3E}">
-        <p14:creationId xmlns:p14="http://schemas.microsoft.com/office/powerpoint/2010/main" val="1561499463"/>
-      </p:ext>
-    </p:extLst>
-  </p:cSld>
-  <p:clrMapOvr>
-    <a:masterClrMapping/>
-  </p:clrMapOvr>
-</p:sld>
-</file>
-
-<file path=ppt/slides/slide20.xml><?xml version="1.0" encoding="utf-8"?>
+<file path=ppt/slides/slide21.xml><?xml version="1.0" encoding="utf-8"?>
 <p:sld xmlns:a="http://schemas.openxmlformats.org/drawingml/2006/main" xmlns:r="http://schemas.openxmlformats.org/officeDocument/2006/relationships" xmlns:p="http://schemas.openxmlformats.org/presentationml/2006/main">
   <p:cSld>
     <p:spTree>
@@ -11786,7 +12871,7 @@
           <a:p>
             <a:fld id="{2FA0223F-D95A-431D-9A71-EDA7FA0C2F5B}" type="slidenum">
               <a:rPr lang="en-US" smtClean="0"/>
-              <a:t>20</a:t>
+              <a:t>21</a:t>
             </a:fld>
             <a:endParaRPr lang="en-US"/>
           </a:p>
@@ -12027,10 +13112,10 @@
       </p:sp>
       <p:pic>
         <p:nvPicPr>
-          <p:cNvPr id="5" name="Immagine 4" descr="Immagine che contiene testo, linea, diagramma, Diagramma&#10;&#10;Descrizione generata automaticamente">
-            <a:extLst>
-              <a:ext uri="{FF2B5EF4-FFF2-40B4-BE49-F238E27FC236}">
-                <a16:creationId xmlns:a16="http://schemas.microsoft.com/office/drawing/2014/main" id="{73E9F2F1-B40C-9EF6-9734-F402D85011D2}"/>
+          <p:cNvPr id="6" name="Immagine 5" descr="Immagine che contiene testo, schermata, linea, Diagramma&#10;&#10;Descrizione generata automaticamente">
+            <a:extLst>
+              <a:ext uri="{FF2B5EF4-FFF2-40B4-BE49-F238E27FC236}">
+                <a16:creationId xmlns:a16="http://schemas.microsoft.com/office/drawing/2014/main" id="{A0BEAE0A-D181-A136-985E-32EBA2520687}"/>
               </a:ext>
             </a:extLst>
           </p:cNvPr>
@@ -12053,8 +13138,8 @@
         </p:blipFill>
         <p:spPr>
           <a:xfrm>
-            <a:off x="4724400" y="1629797"/>
-            <a:ext cx="6480608" cy="4320405"/>
+            <a:off x="5303326" y="1615302"/>
+            <a:ext cx="5974286" cy="3982857"/>
           </a:xfrm>
           <a:prstGeom prst="rect">
             <a:avLst/>
@@ -12074,7 +13159,7 @@
 </p:sld>
 </file>
 
-<file path=ppt/slides/slide21.xml><?xml version="1.0" encoding="utf-8"?>
+<file path=ppt/slides/slide22.xml><?xml version="1.0" encoding="utf-8"?>
 <p:sld xmlns:a="http://schemas.openxmlformats.org/drawingml/2006/main" xmlns:r="http://schemas.openxmlformats.org/officeDocument/2006/relationships" xmlns:p="http://schemas.openxmlformats.org/presentationml/2006/main">
   <p:cSld>
     <p:spTree>
@@ -12155,7 +13240,7 @@
           <a:p>
             <a:fld id="{2FA0223F-D95A-431D-9A71-EDA7FA0C2F5B}" type="slidenum">
               <a:rPr lang="en-US" smtClean="0"/>
-              <a:t>21</a:t>
+              <a:t>22</a:t>
             </a:fld>
             <a:endParaRPr lang="en-US"/>
           </a:p>
@@ -12321,10 +13406,10 @@
       </p:sp>
       <p:pic>
         <p:nvPicPr>
-          <p:cNvPr id="21" name="Immagine 20" descr="Immagine che contiene testo, schermata, numero, diagramma&#10;&#10;Descrizione generata automaticamente">
-            <a:extLst>
-              <a:ext uri="{FF2B5EF4-FFF2-40B4-BE49-F238E27FC236}">
-                <a16:creationId xmlns:a16="http://schemas.microsoft.com/office/drawing/2014/main" id="{DB9D648C-F8E4-DE53-434E-BC2F81DE270D}"/>
+          <p:cNvPr id="5" name="Immagine 4" descr="Immagine che contiene testo, schermata, numero, diagramma&#10;&#10;Descrizione generata automaticamente">
+            <a:extLst>
+              <a:ext uri="{FF2B5EF4-FFF2-40B4-BE49-F238E27FC236}">
+                <a16:creationId xmlns:a16="http://schemas.microsoft.com/office/drawing/2014/main" id="{241D2F86-3B53-95CA-C014-D8D2D93E5A17}"/>
               </a:ext>
             </a:extLst>
           </p:cNvPr>
@@ -12347,7 +13432,7 @@
         </p:blipFill>
         <p:spPr>
           <a:xfrm>
-            <a:off x="607277" y="1989983"/>
+            <a:off x="304248" y="1980839"/>
             <a:ext cx="5486682" cy="3657788"/>
           </a:xfrm>
           <a:prstGeom prst="rect">
@@ -12357,10 +13442,10 @@
       </p:pic>
       <p:pic>
         <p:nvPicPr>
-          <p:cNvPr id="23" name="Immagine 22" descr="Immagine che contiene testo, schermata, numero, diagramma&#10;&#10;Descrizione generata automaticamente">
-            <a:extLst>
-              <a:ext uri="{FF2B5EF4-FFF2-40B4-BE49-F238E27FC236}">
-                <a16:creationId xmlns:a16="http://schemas.microsoft.com/office/drawing/2014/main" id="{C0FF7DE7-B881-FC87-CCDF-B28AAF9AD164}"/>
+          <p:cNvPr id="7" name="Immagine 6" descr="Immagine che contiene testo, schermata, numero, diagramma&#10;&#10;Descrizione generata automaticamente">
+            <a:extLst>
+              <a:ext uri="{FF2B5EF4-FFF2-40B4-BE49-F238E27FC236}">
+                <a16:creationId xmlns:a16="http://schemas.microsoft.com/office/drawing/2014/main" id="{0E02AFDB-2021-5D85-92C6-821E4D1A2777}"/>
               </a:ext>
             </a:extLst>
           </p:cNvPr>
@@ -12383,7 +13468,7 @@
         </p:blipFill>
         <p:spPr>
           <a:xfrm>
-            <a:off x="6098041" y="1980839"/>
+            <a:off x="5790930" y="1980839"/>
             <a:ext cx="5486682" cy="3657788"/>
           </a:xfrm>
           <a:prstGeom prst="rect">
@@ -12404,7 +13489,7 @@
 </p:sld>
 </file>
 
-<file path=ppt/slides/slide22.xml><?xml version="1.0" encoding="utf-8"?>
+<file path=ppt/slides/slide23.xml><?xml version="1.0" encoding="utf-8"?>
 <p:sld xmlns:a="http://schemas.openxmlformats.org/drawingml/2006/main" xmlns:r="http://schemas.openxmlformats.org/officeDocument/2006/relationships" xmlns:p="http://schemas.openxmlformats.org/presentationml/2006/main">
   <p:cSld>
     <p:spTree>
@@ -12485,7 +13570,7 @@
           <a:p>
             <a:fld id="{2FA0223F-D95A-431D-9A71-EDA7FA0C2F5B}" type="slidenum">
               <a:rPr lang="en-US" smtClean="0"/>
-              <a:t>22</a:t>
+              <a:t>23</a:t>
             </a:fld>
             <a:endParaRPr lang="en-US"/>
           </a:p>
@@ -12651,10 +13736,10 @@
       </p:sp>
       <p:pic>
         <p:nvPicPr>
-          <p:cNvPr id="17" name="Immagine 16" descr="Immagine che contiene testo, schermata, numero, diagramma&#10;&#10;Descrizione generata automaticamente">
-            <a:extLst>
-              <a:ext uri="{FF2B5EF4-FFF2-40B4-BE49-F238E27FC236}">
-                <a16:creationId xmlns:a16="http://schemas.microsoft.com/office/drawing/2014/main" id="{BA9A3060-6CF1-9AF4-4BB9-34F73FFE3477}"/>
+          <p:cNvPr id="5" name="Immagine 4" descr="Immagine che contiene testo, schermata, numero, diagramma&#10;&#10;Descrizione generata automaticamente">
+            <a:extLst>
+              <a:ext uri="{FF2B5EF4-FFF2-40B4-BE49-F238E27FC236}">
+                <a16:creationId xmlns:a16="http://schemas.microsoft.com/office/drawing/2014/main" id="{C96802C5-6EB2-FC84-1B2A-E570CFA54D91}"/>
               </a:ext>
             </a:extLst>
           </p:cNvPr>
@@ -12677,7 +13762,7 @@
         </p:blipFill>
         <p:spPr>
           <a:xfrm>
-            <a:off x="607277" y="1980839"/>
+            <a:off x="607278" y="1980839"/>
             <a:ext cx="5486682" cy="3657788"/>
           </a:xfrm>
           <a:prstGeom prst="rect">
@@ -12687,10 +13772,10 @@
       </p:pic>
       <p:pic>
         <p:nvPicPr>
-          <p:cNvPr id="19" name="Immagine 18" descr="Immagine che contiene testo, schermata, numero, diagramma&#10;&#10;Descrizione generata automaticamente">
-            <a:extLst>
-              <a:ext uri="{FF2B5EF4-FFF2-40B4-BE49-F238E27FC236}">
-                <a16:creationId xmlns:a16="http://schemas.microsoft.com/office/drawing/2014/main" id="{2D0E16B5-DEB8-9344-A377-1A858FB2CF56}"/>
+          <p:cNvPr id="10" name="Immagine 9" descr="Immagine che contiene testo, schermata, numero, diagramma&#10;&#10;Descrizione generata automaticamente">
+            <a:extLst>
+              <a:ext uri="{FF2B5EF4-FFF2-40B4-BE49-F238E27FC236}">
+                <a16:creationId xmlns:a16="http://schemas.microsoft.com/office/drawing/2014/main" id="{6C3DB975-B585-79D4-371B-354AAB1161FB}"/>
               </a:ext>
             </a:extLst>
           </p:cNvPr>
@@ -12713,7 +13798,7 @@
         </p:blipFill>
         <p:spPr>
           <a:xfrm>
-            <a:off x="6098041" y="1980839"/>
+            <a:off x="6093960" y="1980839"/>
             <a:ext cx="5486682" cy="3657788"/>
           </a:xfrm>
           <a:prstGeom prst="rect">
@@ -12734,7 +13819,7 @@
 </p:sld>
 </file>
 
-<file path=ppt/slides/slide23.xml><?xml version="1.0" encoding="utf-8"?>
+<file path=ppt/slides/slide24.xml><?xml version="1.0" encoding="utf-8"?>
 <p:sld xmlns:a="http://schemas.openxmlformats.org/drawingml/2006/main" xmlns:r="http://schemas.openxmlformats.org/officeDocument/2006/relationships" xmlns:p="http://schemas.openxmlformats.org/presentationml/2006/main">
   <p:cSld>
     <p:spTree>
@@ -12815,7 +13900,7 @@
           <a:p>
             <a:fld id="{2FA0223F-D95A-431D-9A71-EDA7FA0C2F5B}" type="slidenum">
               <a:rPr lang="en-US" smtClean="0"/>
-              <a:t>23</a:t>
+              <a:t>24</a:t>
             </a:fld>
             <a:endParaRPr lang="en-US"/>
           </a:p>
@@ -12944,7 +14029,7 @@
           <p:nvPr>
             <p:extLst>
               <p:ext uri="{D42A27DB-BD31-4B8C-83A1-F6EECF244321}">
-                <p14:modId xmlns:p14="http://schemas.microsoft.com/office/powerpoint/2010/main" val="4143508878"/>
+                <p14:modId xmlns:p14="http://schemas.microsoft.com/office/powerpoint/2010/main" val="3543610624"/>
               </p:ext>
             </p:extLst>
           </p:nvPr>
@@ -13102,7 +14187,7 @@
                       <a:pPr algn="ctr"/>
                       <a:r>
                         <a:rPr lang="en-GB" sz="1400" noProof="0" dirty="0"/>
-                        <a:t>0.91</a:t>
+                        <a:t>0.94</a:t>
                       </a:r>
                     </a:p>
                   </a:txBody>
@@ -13116,7 +14201,7 @@
                       <a:pPr algn="ctr"/>
                       <a:r>
                         <a:rPr lang="en-GB" sz="1400" noProof="0" dirty="0"/>
-                        <a:t>0.40</a:t>
+                        <a:t>0.36</a:t>
                       </a:r>
                     </a:p>
                   </a:txBody>
@@ -13130,7 +14215,7 @@
                       <a:pPr algn="ctr"/>
                       <a:r>
                         <a:rPr lang="en-GB" sz="1400" noProof="0" dirty="0"/>
-                        <a:t>0.56</a:t>
+                        <a:t>0.53</a:t>
                       </a:r>
                     </a:p>
                   </a:txBody>
@@ -13186,7 +14271,7 @@
                       <a:pPr algn="ctr"/>
                       <a:r>
                         <a:rPr lang="en-GB" sz="1400" noProof="0" dirty="0"/>
-                        <a:t>0.17</a:t>
+                        <a:t>0.20</a:t>
                       </a:r>
                     </a:p>
                   </a:txBody>
@@ -13200,7 +14285,7 @@
                       <a:pPr algn="ctr"/>
                       <a:r>
                         <a:rPr lang="en-GB" sz="1400" noProof="0" dirty="0"/>
-                        <a:t>0.92</a:t>
+                        <a:t>0.87</a:t>
                       </a:r>
                     </a:p>
                   </a:txBody>
@@ -13214,7 +14299,7 @@
                       <a:pPr algn="ctr"/>
                       <a:r>
                         <a:rPr lang="en-GB" sz="1400" noProof="0" dirty="0"/>
-                        <a:t>0.29</a:t>
+                        <a:t>0.32</a:t>
                       </a:r>
                     </a:p>
                   </a:txBody>
@@ -13270,7 +14355,7 @@
                       <a:pPr algn="ctr"/>
                       <a:r>
                         <a:rPr lang="en-GB" sz="1400" noProof="0" dirty="0"/>
-                        <a:t>0.46</a:t>
+                        <a:t>0.30</a:t>
                       </a:r>
                     </a:p>
                   </a:txBody>
@@ -13284,7 +14369,7 @@
                       <a:pPr algn="ctr"/>
                       <a:r>
                         <a:rPr lang="en-GB" sz="1400" noProof="0" dirty="0"/>
-                        <a:t>0.21</a:t>
+                        <a:t>0.49</a:t>
                       </a:r>
                     </a:p>
                   </a:txBody>
@@ -13298,7 +14383,7 @@
                       <a:pPr algn="ctr"/>
                       <a:r>
                         <a:rPr lang="en-GB" sz="1400" noProof="0" dirty="0"/>
-                        <a:t>0.29</a:t>
+                        <a:t>0.38</a:t>
                       </a:r>
                     </a:p>
                   </a:txBody>
@@ -13481,7 +14566,7 @@
                       <a:pPr algn="ctr"/>
                       <a:r>
                         <a:rPr lang="en-GB" sz="1400" noProof="0" dirty="0"/>
-                        <a:t>0.52</a:t>
+                        <a:t>0.48</a:t>
                       </a:r>
                     </a:p>
                   </a:txBody>
@@ -13495,7 +14580,7 @@
                       <a:pPr algn="ctr"/>
                       <a:r>
                         <a:rPr lang="en-GB" sz="1400" noProof="0" dirty="0"/>
-                        <a:t>0.51</a:t>
+                        <a:t>0.58</a:t>
                       </a:r>
                     </a:p>
                   </a:txBody>
@@ -13509,7 +14594,7 @@
                       <a:pPr algn="ctr"/>
                       <a:r>
                         <a:rPr lang="en-GB" sz="1400" noProof="0" dirty="0"/>
-                        <a:t>0.38</a:t>
+                        <a:t>0.41</a:t>
                       </a:r>
                     </a:p>
                   </a:txBody>
@@ -13579,7 +14664,7 @@
                       <a:pPr algn="ctr"/>
                       <a:r>
                         <a:rPr lang="en-GB" sz="1400" noProof="0" dirty="0"/>
-                        <a:t>0.77</a:t>
+                        <a:t>0.78</a:t>
                       </a:r>
                     </a:p>
                   </a:txBody>
@@ -13607,7 +14692,7 @@
                       <a:pPr algn="ctr"/>
                       <a:r>
                         <a:rPr lang="en-GB" sz="1400" noProof="0" dirty="0"/>
-                        <a:t>0.50</a:t>
+                        <a:t>0.48</a:t>
                       </a:r>
                     </a:p>
                   </a:txBody>
@@ -14295,7 +15380,7 @@
 </p:sld>
 </file>
 
-<file path=ppt/slides/slide24.xml><?xml version="1.0" encoding="utf-8"?>
+<file path=ppt/slides/slide25.xml><?xml version="1.0" encoding="utf-8"?>
 <p:sld xmlns:a="http://schemas.openxmlformats.org/drawingml/2006/main" xmlns:r="http://schemas.openxmlformats.org/officeDocument/2006/relationships" xmlns:p="http://schemas.openxmlformats.org/presentationml/2006/main">
   <p:cSld>
     <p:spTree>
@@ -14376,7 +15461,7 @@
           <a:p>
             <a:fld id="{2FA0223F-D95A-431D-9A71-EDA7FA0C2F5B}" type="slidenum">
               <a:rPr lang="en-US" smtClean="0"/>
-              <a:t>24</a:t>
+              <a:t>25</a:t>
             </a:fld>
             <a:endParaRPr lang="en-US"/>
           </a:p>
@@ -14505,7 +15590,7 @@
           <p:nvPr>
             <p:extLst>
               <p:ext uri="{D42A27DB-BD31-4B8C-83A1-F6EECF244321}">
-                <p14:modId xmlns:p14="http://schemas.microsoft.com/office/powerpoint/2010/main" val="1411411083"/>
+                <p14:modId xmlns:p14="http://schemas.microsoft.com/office/powerpoint/2010/main" val="839147914"/>
               </p:ext>
             </p:extLst>
           </p:nvPr>
@@ -14663,7 +15748,7 @@
                       <a:pPr algn="ctr"/>
                       <a:r>
                         <a:rPr lang="en-GB" sz="1400" noProof="0" dirty="0"/>
-                        <a:t>0.93</a:t>
+                        <a:t>0.96</a:t>
                       </a:r>
                     </a:p>
                   </a:txBody>
@@ -14677,7 +15762,7 @@
                       <a:pPr algn="ctr"/>
                       <a:r>
                         <a:rPr lang="en-GB" sz="1400" noProof="0" dirty="0"/>
-                        <a:t>0.33</a:t>
+                        <a:t>0.27</a:t>
                       </a:r>
                     </a:p>
                   </a:txBody>
@@ -14691,7 +15776,7 @@
                       <a:pPr algn="ctr"/>
                       <a:r>
                         <a:rPr lang="en-GB" sz="1400" noProof="0" dirty="0"/>
-                        <a:t>0.49</a:t>
+                        <a:t>0.42</a:t>
                       </a:r>
                     </a:p>
                   </a:txBody>
@@ -14747,7 +15832,7 @@
                       <a:pPr algn="ctr"/>
                       <a:r>
                         <a:rPr lang="en-GB" sz="1400" noProof="0" dirty="0"/>
-                        <a:t>0.17</a:t>
+                        <a:t>0.16</a:t>
                       </a:r>
                     </a:p>
                   </a:txBody>
@@ -14761,7 +15846,7 @@
                       <a:pPr algn="ctr"/>
                       <a:r>
                         <a:rPr lang="en-GB" sz="1400" noProof="0" dirty="0"/>
-                        <a:t>0.97</a:t>
+                        <a:t>0.86</a:t>
                       </a:r>
                     </a:p>
                   </a:txBody>
@@ -14775,7 +15860,7 @@
                       <a:pPr algn="ctr"/>
                       <a:r>
                         <a:rPr lang="en-GB" sz="1400" noProof="0" dirty="0"/>
-                        <a:t>0.28</a:t>
+                        <a:t>0.27</a:t>
                       </a:r>
                     </a:p>
                   </a:txBody>
@@ -14831,7 +15916,7 @@
                       <a:pPr algn="ctr"/>
                       <a:r>
                         <a:rPr lang="en-GB" sz="1400" noProof="0" dirty="0"/>
-                        <a:t>0.86</a:t>
+                        <a:t>0.39</a:t>
                       </a:r>
                     </a:p>
                   </a:txBody>
@@ -14845,7 +15930,7 @@
                       <a:pPr algn="ctr"/>
                       <a:r>
                         <a:rPr lang="en-GB" sz="1400" noProof="0" dirty="0"/>
-                        <a:t>0.32</a:t>
+                        <a:t>0.57</a:t>
                       </a:r>
                     </a:p>
                   </a:txBody>
@@ -14859,7 +15944,7 @@
                       <a:pPr algn="ctr"/>
                       <a:r>
                         <a:rPr lang="en-GB" sz="1400" noProof="0" dirty="0"/>
-                        <a:t>0.47</a:t>
+                        <a:t>0.46</a:t>
                       </a:r>
                     </a:p>
                   </a:txBody>
@@ -14988,7 +16073,7 @@
                       <a:pPr algn="ctr"/>
                       <a:r>
                         <a:rPr lang="en-GB" sz="1400" noProof="0" dirty="0"/>
-                        <a:t>0.41</a:t>
+                        <a:t>0.37</a:t>
                       </a:r>
                     </a:p>
                   </a:txBody>
@@ -15042,7 +16127,7 @@
                       <a:pPr algn="ctr"/>
                       <a:r>
                         <a:rPr lang="en-GB" sz="1400" noProof="0" dirty="0"/>
-                        <a:t>0.65</a:t>
+                        <a:t>0.50</a:t>
                       </a:r>
                     </a:p>
                   </a:txBody>
@@ -15056,7 +16141,7 @@
                       <a:pPr algn="ctr"/>
                       <a:r>
                         <a:rPr lang="en-GB" sz="1400" noProof="0" dirty="0"/>
-                        <a:t>0.54</a:t>
+                        <a:t>0.57</a:t>
                       </a:r>
                     </a:p>
                   </a:txBody>
@@ -15070,7 +16155,7 @@
                       <a:pPr algn="ctr"/>
                       <a:r>
                         <a:rPr lang="en-GB" sz="1400" noProof="0" dirty="0"/>
-                        <a:t>0.42</a:t>
+                        <a:t>0.38</a:t>
                       </a:r>
                     </a:p>
                   </a:txBody>
@@ -15124,7 +16209,21 @@
                       <a:pPr algn="ctr"/>
                       <a:r>
                         <a:rPr lang="en-GB" sz="1400" noProof="0" dirty="0"/>
-                        <a:t>0.83</a:t>
+                        <a:t>0.80</a:t>
+                      </a:r>
+                    </a:p>
+                  </a:txBody>
+                  <a:tcPr anchor="ctr"/>
+                </a:tc>
+                <a:tc>
+                  <a:txBody>
+                    <a:bodyPr/>
+                    <a:lstStyle/>
+                    <a:p>
+                      <a:pPr algn="ctr"/>
+                      <a:r>
+                        <a:rPr lang="en-GB" sz="1400" noProof="0" dirty="0"/>
+                        <a:t>0.37</a:t>
                       </a:r>
                     </a:p>
                   </a:txBody>
@@ -15139,20 +16238,6 @@
                       <a:r>
                         <a:rPr lang="en-GB" sz="1400" noProof="0" dirty="0"/>
                         <a:t>0.41</a:t>
-                      </a:r>
-                    </a:p>
-                  </a:txBody>
-                  <a:tcPr anchor="ctr"/>
-                </a:tc>
-                <a:tc>
-                  <a:txBody>
-                    <a:bodyPr/>
-                    <a:lstStyle/>
-                    <a:p>
-                      <a:pPr algn="ctr"/>
-                      <a:r>
-                        <a:rPr lang="en-GB" sz="1400" noProof="0" dirty="0"/>
-                        <a:t>0.47</a:t>
                       </a:r>
                     </a:p>
                   </a:txBody>
@@ -15824,7 +16909,7 @@
 </p:sld>
 </file>
 
-<file path=ppt/slides/slide25.xml><?xml version="1.0" encoding="utf-8"?>
+<file path=ppt/slides/slide26.xml><?xml version="1.0" encoding="utf-8"?>
 <p:sld xmlns:a="http://schemas.openxmlformats.org/drawingml/2006/main" xmlns:r="http://schemas.openxmlformats.org/officeDocument/2006/relationships" xmlns:p="http://schemas.openxmlformats.org/presentationml/2006/main">
   <p:cSld>
     <p:spTree>
@@ -15994,7 +17079,7 @@
           <a:p>
             <a:fld id="{2FA0223F-D95A-431D-9A71-EDA7FA0C2F5B}" type="slidenum">
               <a:rPr lang="en-US" smtClean="0"/>
-              <a:t>25</a:t>
+              <a:t>26</a:t>
             </a:fld>
             <a:endParaRPr lang="en-US" dirty="0"/>
           </a:p>
@@ -16013,7 +17098,7 @@
 </p:sld>
 </file>
 
-<file path=ppt/slides/slide26.xml><?xml version="1.0" encoding="utf-8"?>
+<file path=ppt/slides/slide27.xml><?xml version="1.0" encoding="utf-8"?>
 <p:sld xmlns:a="http://schemas.openxmlformats.org/drawingml/2006/main" xmlns:r="http://schemas.openxmlformats.org/officeDocument/2006/relationships" xmlns:p="http://schemas.openxmlformats.org/presentationml/2006/main">
   <p:cSld>
     <p:spTree>
@@ -16094,7 +17179,7 @@
           <a:p>
             <a:fld id="{2FA0223F-D95A-431D-9A71-EDA7FA0C2F5B}" type="slidenum">
               <a:rPr lang="en-US" smtClean="0"/>
-              <a:t>26</a:t>
+              <a:t>27</a:t>
             </a:fld>
             <a:endParaRPr lang="en-US"/>
           </a:p>

</xml_diff>